<commit_message>
Update presentation for CYS
</commit_message>
<xml_diff>
--- a/presentation materials/КМУ/Егоров М.П, ПогребнойД.А. АРХАРХИТЕКТУРА МОДУЛЯ ЯЗЫКОВОЙ МОДЕЛИ ДЛЯ ПРЕДСКАЗАНИЯ.pptx
+++ b/presentation materials/КМУ/Егоров М.П, ПогребнойД.А. АРХАРХИТЕКТУРА МОДУЛЯ ЯЗЫКОВОЙ МОДЕЛИ ДЛЯ ПРЕДСКАЗАНИЯ.pptx
@@ -9,11 +9,13 @@
     <p:sldId id="257" r:id="rId3"/>
     <p:sldId id="260" r:id="rId4"/>
     <p:sldId id="259" r:id="rId5"/>
-    <p:sldId id="264" r:id="rId6"/>
-    <p:sldId id="261" r:id="rId7"/>
-    <p:sldId id="262" r:id="rId8"/>
-    <p:sldId id="263" r:id="rId9"/>
-    <p:sldId id="258" r:id="rId10"/>
+    <p:sldId id="265" r:id="rId6"/>
+    <p:sldId id="264" r:id="rId7"/>
+    <p:sldId id="261" r:id="rId8"/>
+    <p:sldId id="262" r:id="rId9"/>
+    <p:sldId id="263" r:id="rId10"/>
+    <p:sldId id="266" r:id="rId11"/>
+    <p:sldId id="258" r:id="rId12"/>
   </p:sldIdLst>
   <p:sldSz cx="12192000" cy="6858000"/>
   <p:notesSz cx="6858000" cy="9144000"/>
@@ -267,7 +269,7 @@
           <a:p>
             <a:fld id="{CC946C17-EC51-4C45-A425-4C391F8FB757}" type="datetimeFigureOut">
               <a:rPr lang="ru-RU" smtClean="0"/>
-              <a:t>30.03.2023</a:t>
+              <a:t>02.04.2023</a:t>
             </a:fld>
             <a:endParaRPr lang="ru-RU"/>
           </a:p>
@@ -465,7 +467,7 @@
           <a:p>
             <a:fld id="{CC946C17-EC51-4C45-A425-4C391F8FB757}" type="datetimeFigureOut">
               <a:rPr lang="ru-RU" smtClean="0"/>
-              <a:t>30.03.2023</a:t>
+              <a:t>02.04.2023</a:t>
             </a:fld>
             <a:endParaRPr lang="ru-RU"/>
           </a:p>
@@ -673,7 +675,7 @@
           <a:p>
             <a:fld id="{CC946C17-EC51-4C45-A425-4C391F8FB757}" type="datetimeFigureOut">
               <a:rPr lang="ru-RU" smtClean="0"/>
-              <a:t>30.03.2023</a:t>
+              <a:t>02.04.2023</a:t>
             </a:fld>
             <a:endParaRPr lang="ru-RU"/>
           </a:p>
@@ -871,7 +873,7 @@
           <a:p>
             <a:fld id="{CC946C17-EC51-4C45-A425-4C391F8FB757}" type="datetimeFigureOut">
               <a:rPr lang="ru-RU" smtClean="0"/>
-              <a:t>30.03.2023</a:t>
+              <a:t>02.04.2023</a:t>
             </a:fld>
             <a:endParaRPr lang="ru-RU"/>
           </a:p>
@@ -1146,7 +1148,7 @@
           <a:p>
             <a:fld id="{CC946C17-EC51-4C45-A425-4C391F8FB757}" type="datetimeFigureOut">
               <a:rPr lang="ru-RU" smtClean="0"/>
-              <a:t>30.03.2023</a:t>
+              <a:t>02.04.2023</a:t>
             </a:fld>
             <a:endParaRPr lang="ru-RU"/>
           </a:p>
@@ -1411,7 +1413,7 @@
           <a:p>
             <a:fld id="{CC946C17-EC51-4C45-A425-4C391F8FB757}" type="datetimeFigureOut">
               <a:rPr lang="ru-RU" smtClean="0"/>
-              <a:t>30.03.2023</a:t>
+              <a:t>02.04.2023</a:t>
             </a:fld>
             <a:endParaRPr lang="ru-RU"/>
           </a:p>
@@ -1823,7 +1825,7 @@
           <a:p>
             <a:fld id="{CC946C17-EC51-4C45-A425-4C391F8FB757}" type="datetimeFigureOut">
               <a:rPr lang="ru-RU" smtClean="0"/>
-              <a:t>30.03.2023</a:t>
+              <a:t>02.04.2023</a:t>
             </a:fld>
             <a:endParaRPr lang="ru-RU"/>
           </a:p>
@@ -1964,7 +1966,7 @@
           <a:p>
             <a:fld id="{CC946C17-EC51-4C45-A425-4C391F8FB757}" type="datetimeFigureOut">
               <a:rPr lang="ru-RU" smtClean="0"/>
-              <a:t>30.03.2023</a:t>
+              <a:t>02.04.2023</a:t>
             </a:fld>
             <a:endParaRPr lang="ru-RU"/>
           </a:p>
@@ -2077,7 +2079,7 @@
           <a:p>
             <a:fld id="{CC946C17-EC51-4C45-A425-4C391F8FB757}" type="datetimeFigureOut">
               <a:rPr lang="ru-RU" smtClean="0"/>
-              <a:t>30.03.2023</a:t>
+              <a:t>02.04.2023</a:t>
             </a:fld>
             <a:endParaRPr lang="ru-RU"/>
           </a:p>
@@ -2388,7 +2390,7 @@
           <a:p>
             <a:fld id="{CC946C17-EC51-4C45-A425-4C391F8FB757}" type="datetimeFigureOut">
               <a:rPr lang="ru-RU" smtClean="0"/>
-              <a:t>30.03.2023</a:t>
+              <a:t>02.04.2023</a:t>
             </a:fld>
             <a:endParaRPr lang="ru-RU"/>
           </a:p>
@@ -2676,7 +2678,7 @@
           <a:p>
             <a:fld id="{CC946C17-EC51-4C45-A425-4C391F8FB757}" type="datetimeFigureOut">
               <a:rPr lang="ru-RU" smtClean="0"/>
-              <a:t>30.03.2023</a:t>
+              <a:t>02.04.2023</a:t>
             </a:fld>
             <a:endParaRPr lang="ru-RU"/>
           </a:p>
@@ -2917,7 +2919,7 @@
           <a:p>
             <a:fld id="{CC946C17-EC51-4C45-A425-4C391F8FB757}" type="datetimeFigureOut">
               <a:rPr lang="ru-RU" smtClean="0"/>
-              <a:t>30.03.2023</a:t>
+              <a:t>02.04.2023</a:t>
             </a:fld>
             <a:endParaRPr lang="ru-RU"/>
           </a:p>
@@ -3647,6 +3649,333 @@
 </p:sld>
 </file>
 
+<file path=ppt/slides/slide10.xml><?xml version="1.0" encoding="utf-8"?>
+<p:sld xmlns:a="http://schemas.openxmlformats.org/drawingml/2006/main" xmlns:r="http://schemas.openxmlformats.org/officeDocument/2006/relationships" xmlns:p="http://schemas.openxmlformats.org/presentationml/2006/main">
+  <p:cSld>
+    <p:spTree>
+      <p:nvGrpSpPr>
+        <p:cNvPr id="1" name=""/>
+        <p:cNvGrpSpPr/>
+        <p:nvPr/>
+      </p:nvGrpSpPr>
+      <p:grpSpPr>
+        <a:xfrm>
+          <a:off x="0" y="0"/>
+          <a:ext cx="0" cy="0"/>
+          <a:chOff x="0" y="0"/>
+          <a:chExt cx="0" cy="0"/>
+        </a:xfrm>
+      </p:grpSpPr>
+      <p:pic>
+        <p:nvPicPr>
+          <p:cNvPr id="3" name="Рисунок 2">
+            <a:extLst>
+              <a:ext uri="{FF2B5EF4-FFF2-40B4-BE49-F238E27FC236}">
+                <a16:creationId xmlns:a16="http://schemas.microsoft.com/office/drawing/2014/main" id="{A8692761-F9A2-4120-B903-D14C9B7F3ABC}"/>
+              </a:ext>
+            </a:extLst>
+          </p:cNvPr>
+          <p:cNvPicPr>
+            <a:picLocks noChangeAspect="1"/>
+          </p:cNvPicPr>
+          <p:nvPr/>
+        </p:nvPicPr>
+        <p:blipFill>
+          <a:blip r:embed="rId2">
+            <a:extLst>
+              <a:ext uri="{28A0092B-C50C-407E-A947-70E740481C1C}">
+                <a14:useLocalDpi xmlns:a14="http://schemas.microsoft.com/office/drawing/2010/main" val="0"/>
+              </a:ext>
+            </a:extLst>
+          </a:blip>
+          <a:stretch>
+            <a:fillRect/>
+          </a:stretch>
+        </p:blipFill>
+        <p:spPr>
+          <a:xfrm>
+            <a:off x="0" y="1785"/>
+            <a:ext cx="12192000" cy="6854430"/>
+          </a:xfrm>
+          <a:prstGeom prst="rect">
+            <a:avLst/>
+          </a:prstGeom>
+        </p:spPr>
+      </p:pic>
+      <p:sp>
+        <p:nvSpPr>
+          <p:cNvPr id="2" name="TextBox 1"/>
+          <p:cNvSpPr txBox="1"/>
+          <p:nvPr/>
+        </p:nvSpPr>
+        <p:spPr>
+          <a:xfrm>
+            <a:off x="457200" y="411480"/>
+            <a:ext cx="4028667" cy="523220"/>
+          </a:xfrm>
+          <a:prstGeom prst="rect">
+            <a:avLst/>
+          </a:prstGeom>
+          <a:noFill/>
+        </p:spPr>
+        <p:txBody>
+          <a:bodyPr wrap="none" rtlCol="0">
+            <a:spAutoFit/>
+          </a:bodyPr>
+          <a:lstStyle/>
+          <a:p>
+            <a:r>
+              <a:rPr lang="ru-RU" sz="2800" dirty="0" smtClean="0">
+                <a:latin typeface="Montserrat SemiBold" panose="00000700000000000000" pitchFamily="2" charset="0"/>
+                <a:cs typeface="Gotham Pro Medium" panose="02000603030000020004" pitchFamily="50" charset="0"/>
+              </a:rPr>
+              <a:t>Дальнейшие планы</a:t>
+            </a:r>
+            <a:endParaRPr lang="ru-RU" sz="2800" dirty="0">
+              <a:latin typeface="Montserrat SemiBold" panose="00000700000000000000" pitchFamily="2" charset="0"/>
+              <a:cs typeface="Gotham Pro Medium" panose="02000603030000020004" pitchFamily="50" charset="0"/>
+            </a:endParaRPr>
+          </a:p>
+        </p:txBody>
+      </p:sp>
+      <p:sp>
+        <p:nvSpPr>
+          <p:cNvPr id="6" name="TextBox 5"/>
+          <p:cNvSpPr txBox="1"/>
+          <p:nvPr/>
+        </p:nvSpPr>
+        <p:spPr>
+          <a:xfrm>
+            <a:off x="457200" y="1271243"/>
+            <a:ext cx="11265408" cy="2123658"/>
+          </a:xfrm>
+          <a:prstGeom prst="rect">
+            <a:avLst/>
+          </a:prstGeom>
+          <a:noFill/>
+        </p:spPr>
+        <p:txBody>
+          <a:bodyPr wrap="square" rtlCol="0">
+            <a:spAutoFit/>
+          </a:bodyPr>
+          <a:lstStyle/>
+          <a:p>
+            <a:pPr marL="342900" indent="-342900">
+              <a:lnSpc>
+                <a:spcPct val="150000"/>
+              </a:lnSpc>
+              <a:buFont typeface="Arial" panose="020B0604020202020204" pitchFamily="34" charset="0"/>
+              <a:buChar char="•"/>
+            </a:pPr>
+            <a:r>
+              <a:rPr lang="ru-RU" sz="2200">
+                <a:latin typeface="Gotham Pro" panose="02000503040000020004" pitchFamily="50" charset="0"/>
+                <a:cs typeface="Gotham Pro" panose="02000503040000020004" pitchFamily="50" charset="0"/>
+              </a:rPr>
+              <a:t>Замерить метрики </a:t>
+            </a:r>
+            <a:r>
+              <a:rPr lang="ru-RU" sz="2200">
+                <a:latin typeface="Gotham Pro" panose="02000503040000020004" pitchFamily="50" charset="0"/>
+                <a:cs typeface="Gotham Pro" panose="02000503040000020004" pitchFamily="50" charset="0"/>
+              </a:rPr>
+              <a:t>качества </a:t>
+            </a:r>
+            <a:r>
+              <a:rPr lang="ru-RU" sz="2200" smtClean="0">
+                <a:latin typeface="Gotham Pro" panose="02000503040000020004" pitchFamily="50" charset="0"/>
+                <a:cs typeface="Gotham Pro" panose="02000503040000020004" pitchFamily="50" charset="0"/>
+              </a:rPr>
+              <a:t>инструмента</a:t>
+            </a:r>
+            <a:endParaRPr lang="ru-RU" sz="2200" smtClean="0">
+              <a:latin typeface="Gotham Pro" panose="02000503040000020004" pitchFamily="50" charset="0"/>
+              <a:cs typeface="Gotham Pro" panose="02000503040000020004" pitchFamily="50" charset="0"/>
+            </a:endParaRPr>
+          </a:p>
+          <a:p>
+            <a:pPr marL="342900" indent="-342900">
+              <a:lnSpc>
+                <a:spcPct val="150000"/>
+              </a:lnSpc>
+              <a:buFont typeface="Arial" panose="020B0604020202020204" pitchFamily="34" charset="0"/>
+              <a:buChar char="•"/>
+            </a:pPr>
+            <a:r>
+              <a:rPr lang="ru-RU" sz="2200" dirty="0" smtClean="0">
+                <a:latin typeface="Gotham Pro" panose="02000503040000020004" pitchFamily="50" charset="0"/>
+                <a:cs typeface="Gotham Pro" panose="02000503040000020004" pitchFamily="50" charset="0"/>
+              </a:rPr>
+              <a:t>Поддержать работу с большем количеством симптомов</a:t>
+            </a:r>
+          </a:p>
+          <a:p>
+            <a:pPr marL="342900" indent="-342900">
+              <a:lnSpc>
+                <a:spcPct val="150000"/>
+              </a:lnSpc>
+              <a:buFont typeface="Arial" panose="020B0604020202020204" pitchFamily="34" charset="0"/>
+              <a:buChar char="•"/>
+            </a:pPr>
+            <a:r>
+              <a:rPr lang="ru-RU" sz="2200" dirty="0" smtClean="0">
+                <a:latin typeface="Gotham Pro" panose="02000503040000020004" pitchFamily="50" charset="0"/>
+                <a:cs typeface="Gotham Pro" panose="02000503040000020004" pitchFamily="50" charset="0"/>
+              </a:rPr>
+              <a:t>Улучшить точность распознавания симптомов</a:t>
+            </a:r>
+          </a:p>
+          <a:p>
+            <a:pPr marL="342900" indent="-342900">
+              <a:lnSpc>
+                <a:spcPct val="150000"/>
+              </a:lnSpc>
+              <a:buFont typeface="Arial" panose="020B0604020202020204" pitchFamily="34" charset="0"/>
+              <a:buChar char="•"/>
+            </a:pPr>
+            <a:r>
+              <a:rPr lang="ru-RU" sz="2200" dirty="0" smtClean="0">
+                <a:latin typeface="Gotham Pro" panose="02000503040000020004" pitchFamily="50" charset="0"/>
+                <a:cs typeface="Gotham Pro" panose="02000503040000020004" pitchFamily="50" charset="0"/>
+              </a:rPr>
+              <a:t>Провести эксперименты с более сложными моделями</a:t>
+            </a:r>
+            <a:endParaRPr lang="ru-RU" sz="2200" dirty="0">
+              <a:latin typeface="Gotham Pro" panose="02000503040000020004" pitchFamily="50" charset="0"/>
+              <a:cs typeface="Gotham Pro" panose="02000503040000020004" pitchFamily="50" charset="0"/>
+            </a:endParaRPr>
+          </a:p>
+        </p:txBody>
+      </p:sp>
+      <p:sp>
+        <p:nvSpPr>
+          <p:cNvPr id="5" name="TextBox 4"/>
+          <p:cNvSpPr txBox="1"/>
+          <p:nvPr/>
+        </p:nvSpPr>
+        <p:spPr>
+          <a:xfrm>
+            <a:off x="11311128" y="5477256"/>
+            <a:ext cx="711092" cy="369332"/>
+          </a:xfrm>
+          <a:prstGeom prst="rect">
+            <a:avLst/>
+          </a:prstGeom>
+          <a:noFill/>
+        </p:spPr>
+        <p:txBody>
+          <a:bodyPr wrap="none" rtlCol="0">
+            <a:spAutoFit/>
+          </a:bodyPr>
+          <a:lstStyle/>
+          <a:p>
+            <a:r>
+              <a:rPr lang="ru-RU" dirty="0" smtClean="0">
+                <a:latin typeface="Gotham Pro" panose="02000503040000020004" pitchFamily="50" charset="0"/>
+                <a:cs typeface="Gotham Pro" panose="02000503040000020004" pitchFamily="50" charset="0"/>
+              </a:rPr>
+              <a:t>10/11</a:t>
+            </a:r>
+            <a:endParaRPr lang="ru-RU" dirty="0">
+              <a:latin typeface="Gotham Pro" panose="02000503040000020004" pitchFamily="50" charset="0"/>
+              <a:cs typeface="Gotham Pro" panose="02000503040000020004" pitchFamily="50" charset="0"/>
+            </a:endParaRPr>
+          </a:p>
+        </p:txBody>
+      </p:sp>
+    </p:spTree>
+    <p:extLst>
+      <p:ext uri="{BB962C8B-B14F-4D97-AF65-F5344CB8AC3E}">
+        <p14:creationId xmlns:p14="http://schemas.microsoft.com/office/powerpoint/2010/main" val="3346187899"/>
+      </p:ext>
+    </p:extLst>
+  </p:cSld>
+  <p:clrMapOvr>
+    <a:masterClrMapping/>
+  </p:clrMapOvr>
+  <p:timing>
+    <p:tnLst>
+      <p:par>
+        <p:cTn id="1" dur="indefinite" restart="never" nodeType="tmRoot"/>
+      </p:par>
+    </p:tnLst>
+  </p:timing>
+</p:sld>
+</file>
+
+<file path=ppt/slides/slide11.xml><?xml version="1.0" encoding="utf-8"?>
+<p:sld xmlns:a="http://schemas.openxmlformats.org/drawingml/2006/main" xmlns:r="http://schemas.openxmlformats.org/officeDocument/2006/relationships" xmlns:p="http://schemas.openxmlformats.org/presentationml/2006/main">
+  <p:cSld>
+    <p:spTree>
+      <p:nvGrpSpPr>
+        <p:cNvPr id="1" name=""/>
+        <p:cNvGrpSpPr/>
+        <p:nvPr/>
+      </p:nvGrpSpPr>
+      <p:grpSpPr>
+        <a:xfrm>
+          <a:off x="0" y="0"/>
+          <a:ext cx="0" cy="0"/>
+          <a:chOff x="0" y="0"/>
+          <a:chExt cx="0" cy="0"/>
+        </a:xfrm>
+      </p:grpSpPr>
+      <p:pic>
+        <p:nvPicPr>
+          <p:cNvPr id="3" name="Рисунок 2">
+            <a:extLst>
+              <a:ext uri="{FF2B5EF4-FFF2-40B4-BE49-F238E27FC236}">
+                <a16:creationId xmlns:a16="http://schemas.microsoft.com/office/drawing/2014/main" id="{652C3130-651D-43CB-85BA-61D12C420DAE}"/>
+              </a:ext>
+            </a:extLst>
+          </p:cNvPr>
+          <p:cNvPicPr>
+            <a:picLocks noChangeAspect="1"/>
+          </p:cNvPicPr>
+          <p:nvPr/>
+        </p:nvPicPr>
+        <p:blipFill>
+          <a:blip r:embed="rId2">
+            <a:extLst>
+              <a:ext uri="{28A0092B-C50C-407E-A947-70E740481C1C}">
+                <a14:useLocalDpi xmlns:a14="http://schemas.microsoft.com/office/drawing/2010/main" val="0"/>
+              </a:ext>
+            </a:extLst>
+          </a:blip>
+          <a:stretch>
+            <a:fillRect/>
+          </a:stretch>
+        </p:blipFill>
+        <p:spPr>
+          <a:xfrm>
+            <a:off x="0" y="1785"/>
+            <a:ext cx="12192000" cy="6854430"/>
+          </a:xfrm>
+          <a:prstGeom prst="rect">
+            <a:avLst/>
+          </a:prstGeom>
+        </p:spPr>
+      </p:pic>
+    </p:spTree>
+    <p:extLst>
+      <p:ext uri="{BB962C8B-B14F-4D97-AF65-F5344CB8AC3E}">
+        <p14:creationId xmlns:p14="http://schemas.microsoft.com/office/powerpoint/2010/main" val="2007705612"/>
+      </p:ext>
+    </p:extLst>
+  </p:cSld>
+  <p:clrMapOvr>
+    <a:masterClrMapping/>
+  </p:clrMapOvr>
+  <p:timing>
+    <p:tnLst>
+      <p:par>
+        <p:cTn id="1" dur="indefinite" restart="never" nodeType="tmRoot"/>
+      </p:par>
+    </p:tnLst>
+  </p:timing>
+</p:sld>
+</file>
+
 <file path=ppt/slides/slide2.xml><?xml version="1.0" encoding="utf-8"?>
 <p:sld xmlns:a="http://schemas.openxmlformats.org/drawingml/2006/main" xmlns:r="http://schemas.openxmlformats.org/officeDocument/2006/relationships" xmlns:p="http://schemas.openxmlformats.org/presentationml/2006/main">
   <p:cSld>
@@ -3880,7 +4209,7 @@
         <p:spPr>
           <a:xfrm>
             <a:off x="11311128" y="5477256"/>
-            <a:ext cx="584006" cy="369332"/>
+            <a:ext cx="608565" cy="369332"/>
           </a:xfrm>
           <a:prstGeom prst="rect">
             <a:avLst/>
@@ -3898,8 +4227,12 @@
                 <a:latin typeface="Gotham Pro" panose="02000503040000020004" pitchFamily="50" charset="0"/>
                 <a:cs typeface="Gotham Pro" panose="02000503040000020004" pitchFamily="50" charset="0"/>
               </a:rPr>
-              <a:t>2/9</a:t>
-            </a:r>
+              <a:t>2/11</a:t>
+            </a:r>
+            <a:endParaRPr lang="ru-RU" dirty="0" smtClean="0">
+              <a:latin typeface="Gotham Pro" panose="02000503040000020004" pitchFamily="50" charset="0"/>
+              <a:cs typeface="Gotham Pro" panose="02000503040000020004" pitchFamily="50" charset="0"/>
+            </a:endParaRPr>
           </a:p>
         </p:txBody>
       </p:sp>
@@ -4275,7 +4608,7 @@
         <p:spPr>
           <a:xfrm>
             <a:off x="11311128" y="5477256"/>
-            <a:ext cx="584904" cy="369332"/>
+            <a:ext cx="609462" cy="369332"/>
           </a:xfrm>
           <a:prstGeom prst="rect">
             <a:avLst/>
@@ -4293,7 +4626,7 @@
                 <a:latin typeface="Gotham Pro" panose="02000503040000020004" pitchFamily="50" charset="0"/>
                 <a:cs typeface="Gotham Pro" panose="02000503040000020004" pitchFamily="50" charset="0"/>
               </a:rPr>
-              <a:t>3/9</a:t>
+              <a:t>3/11</a:t>
             </a:r>
             <a:endParaRPr lang="ru-RU" dirty="0">
               <a:latin typeface="Gotham Pro" panose="02000503040000020004" pitchFamily="50" charset="0"/>
@@ -4504,7 +4837,7 @@
         <p:spPr>
           <a:xfrm>
             <a:off x="11311128" y="5477256"/>
-            <a:ext cx="597023" cy="369332"/>
+            <a:ext cx="621580" cy="369332"/>
           </a:xfrm>
           <a:prstGeom prst="rect">
             <a:avLst/>
@@ -4522,7 +4855,7 @@
                 <a:latin typeface="Gotham Pro" panose="02000503040000020004" pitchFamily="50" charset="0"/>
                 <a:cs typeface="Gotham Pro" panose="02000503040000020004" pitchFamily="50" charset="0"/>
               </a:rPr>
-              <a:t>4/9</a:t>
+              <a:t>4/11</a:t>
             </a:r>
             <a:endParaRPr lang="ru-RU" dirty="0">
               <a:latin typeface="Gotham Pro" panose="02000503040000020004" pitchFamily="50" charset="0"/>
@@ -4613,7 +4946,7 @@
         <p:spPr>
           <a:xfrm>
             <a:off x="457200" y="411480"/>
-            <a:ext cx="2659702" cy="523220"/>
+            <a:ext cx="1713931" cy="523220"/>
           </a:xfrm>
           <a:prstGeom prst="rect">
             <a:avLst/>
@@ -4627,11 +4960,11 @@
           <a:lstStyle/>
           <a:p>
             <a:r>
-              <a:rPr lang="ru-RU" sz="2800" dirty="0" smtClean="0">
+              <a:rPr lang="ru-RU" sz="2800" dirty="0" err="1" smtClean="0">
                 <a:latin typeface="Montserrat SemiBold" panose="00000700000000000000" pitchFamily="2" charset="0"/>
                 <a:cs typeface="Gotham Pro Medium" panose="02000603030000020004" pitchFamily="50" charset="0"/>
               </a:rPr>
-              <a:t>Архитектура</a:t>
+              <a:t>Датасет</a:t>
             </a:r>
             <a:endParaRPr lang="ru-RU" sz="2800" dirty="0">
               <a:latin typeface="Montserrat SemiBold" panose="00000700000000000000" pitchFamily="2" charset="0"/>
@@ -4648,8 +4981,8 @@
         </p:nvSpPr>
         <p:spPr>
           <a:xfrm>
-            <a:off x="11311128" y="5477256"/>
-            <a:ext cx="582595" cy="369332"/>
+            <a:off x="457200" y="1271243"/>
+            <a:ext cx="11265408" cy="4493538"/>
           </a:xfrm>
           <a:prstGeom prst="rect">
             <a:avLst/>
@@ -4657,24 +4990,244 @@
           <a:noFill/>
         </p:spPr>
         <p:txBody>
+          <a:bodyPr wrap="square" rtlCol="0">
+            <a:spAutoFit/>
+          </a:bodyPr>
+          <a:lstStyle/>
+          <a:p>
+            <a:pPr marL="342900" indent="-342900">
+              <a:buFont typeface="Arial" panose="020B0604020202020204" pitchFamily="34" charset="0"/>
+              <a:buChar char="•"/>
+            </a:pPr>
+            <a:r>
+              <a:rPr lang="ru-RU" sz="2200" dirty="0" smtClean="0">
+                <a:latin typeface="Gotham Pro" panose="02000503040000020004" pitchFamily="50" charset="0"/>
+                <a:cs typeface="Gotham Pro" panose="02000503040000020004" pitchFamily="50" charset="0"/>
+              </a:rPr>
+              <a:t>Данные </a:t>
+            </a:r>
+            <a:r>
+              <a:rPr lang="ru-RU" sz="2200" dirty="0" smtClean="0">
+                <a:latin typeface="Gotham Pro" panose="02000503040000020004" pitchFamily="50" charset="0"/>
+                <a:cs typeface="Gotham Pro" panose="02000503040000020004" pitchFamily="50" charset="0"/>
+              </a:rPr>
+              <a:t>для обучения и </a:t>
+            </a:r>
+            <a:r>
+              <a:rPr lang="ru-RU" sz="2200" dirty="0" err="1" smtClean="0">
+                <a:latin typeface="Gotham Pro" panose="02000503040000020004" pitchFamily="50" charset="0"/>
+                <a:cs typeface="Gotham Pro" panose="02000503040000020004" pitchFamily="50" charset="0"/>
+              </a:rPr>
+              <a:t>валидации</a:t>
+            </a:r>
+            <a:endParaRPr lang="ru-RU" sz="2200" dirty="0" smtClean="0">
+              <a:latin typeface="Gotham Pro" panose="02000503040000020004" pitchFamily="50" charset="0"/>
+              <a:cs typeface="Gotham Pro" panose="02000503040000020004" pitchFamily="50" charset="0"/>
+            </a:endParaRPr>
+          </a:p>
+          <a:p>
+            <a:pPr marL="800100" lvl="1" indent="-342900">
+              <a:buFont typeface="Arial" panose="020B0604020202020204" pitchFamily="34" charset="0"/>
+              <a:buChar char="•"/>
+            </a:pPr>
+            <a:r>
+              <a:rPr lang="ru-RU" sz="2200" dirty="0">
+                <a:latin typeface="Gotham Pro" panose="02000503040000020004" pitchFamily="50" charset="0"/>
+                <a:cs typeface="Gotham Pro" panose="02000503040000020004" pitchFamily="50" charset="0"/>
+              </a:rPr>
+              <a:t>Априорные знания о болезнях и их </a:t>
+            </a:r>
+            <a:r>
+              <a:rPr lang="ru-RU" sz="2200" dirty="0" smtClean="0">
+                <a:latin typeface="Gotham Pro" panose="02000503040000020004" pitchFamily="50" charset="0"/>
+                <a:cs typeface="Gotham Pro" panose="02000503040000020004" pitchFamily="50" charset="0"/>
+              </a:rPr>
+              <a:t>симптомах</a:t>
+            </a:r>
+            <a:endParaRPr lang="ru-RU" sz="2200" dirty="0" smtClean="0">
+              <a:latin typeface="Gotham Pro" panose="02000503040000020004" pitchFamily="50" charset="0"/>
+              <a:cs typeface="Gotham Pro" panose="02000503040000020004" pitchFamily="50" charset="0"/>
+            </a:endParaRPr>
+          </a:p>
+          <a:p>
+            <a:pPr marL="800100" lvl="1" indent="-342900">
+              <a:buFont typeface="Arial" panose="020B0604020202020204" pitchFamily="34" charset="0"/>
+              <a:buChar char="•"/>
+            </a:pPr>
+            <a:r>
+              <a:rPr lang="ru-RU" sz="2200" dirty="0" smtClean="0">
+                <a:latin typeface="Gotham Pro" panose="02000503040000020004" pitchFamily="50" charset="0"/>
+                <a:cs typeface="Gotham Pro" panose="02000503040000020004" pitchFamily="50" charset="0"/>
+              </a:rPr>
+              <a:t>Собранный </a:t>
+            </a:r>
+            <a:r>
+              <a:rPr lang="ru-RU" sz="2200" dirty="0" err="1" smtClean="0">
+                <a:latin typeface="Gotham Pro" panose="02000503040000020004" pitchFamily="50" charset="0"/>
+                <a:cs typeface="Gotham Pro" panose="02000503040000020004" pitchFamily="50" charset="0"/>
+              </a:rPr>
+              <a:t>датасет</a:t>
+            </a:r>
+            <a:r>
+              <a:rPr lang="ru-RU" sz="2200" dirty="0" smtClean="0">
+                <a:latin typeface="Gotham Pro" panose="02000503040000020004" pitchFamily="50" charset="0"/>
+                <a:cs typeface="Gotham Pro" panose="02000503040000020004" pitchFamily="50" charset="0"/>
+              </a:rPr>
+              <a:t> симптомов и болезней на </a:t>
+            </a:r>
+            <a:r>
+              <a:rPr lang="en-US" sz="2200" dirty="0" err="1" smtClean="0">
+                <a:latin typeface="Gotham Pro" panose="02000503040000020004" pitchFamily="50" charset="0"/>
+                <a:cs typeface="Gotham Pro" panose="02000503040000020004" pitchFamily="50" charset="0"/>
+                <a:hlinkClick r:id="rId3"/>
+              </a:rPr>
+              <a:t>Kaggle</a:t>
+            </a:r>
+            <a:r>
+              <a:rPr lang="ru-RU" sz="2200" dirty="0" smtClean="0">
+                <a:latin typeface="Gotham Pro" panose="02000503040000020004" pitchFamily="50" charset="0"/>
+                <a:cs typeface="Gotham Pro" panose="02000503040000020004" pitchFamily="50" charset="0"/>
+              </a:rPr>
+              <a:t> – 5193 записи</a:t>
+            </a:r>
+          </a:p>
+          <a:p>
+            <a:pPr marL="800100" lvl="1" indent="-342900">
+              <a:buFont typeface="Arial" panose="020B0604020202020204" pitchFamily="34" charset="0"/>
+              <a:buChar char="•"/>
+            </a:pPr>
+            <a:endParaRPr lang="ru-RU" sz="2200" dirty="0">
+              <a:latin typeface="Gotham Pro" panose="02000503040000020004" pitchFamily="50" charset="0"/>
+              <a:cs typeface="Gotham Pro" panose="02000503040000020004" pitchFamily="50" charset="0"/>
+            </a:endParaRPr>
+          </a:p>
+          <a:p>
+            <a:pPr marL="800100" lvl="1" indent="-342900">
+              <a:buFont typeface="Arial" panose="020B0604020202020204" pitchFamily="34" charset="0"/>
+              <a:buChar char="•"/>
+            </a:pPr>
+            <a:endParaRPr lang="ru-RU" sz="2200" dirty="0" smtClean="0">
+              <a:latin typeface="Gotham Pro" panose="02000503040000020004" pitchFamily="50" charset="0"/>
+              <a:cs typeface="Gotham Pro" panose="02000503040000020004" pitchFamily="50" charset="0"/>
+            </a:endParaRPr>
+          </a:p>
+          <a:p>
+            <a:pPr marL="800100" lvl="1" indent="-342900">
+              <a:buFont typeface="Arial" panose="020B0604020202020204" pitchFamily="34" charset="0"/>
+              <a:buChar char="•"/>
+            </a:pPr>
+            <a:endParaRPr lang="ru-RU" sz="2200" dirty="0">
+              <a:latin typeface="Gotham Pro" panose="02000503040000020004" pitchFamily="50" charset="0"/>
+              <a:cs typeface="Gotham Pro" panose="02000503040000020004" pitchFamily="50" charset="0"/>
+            </a:endParaRPr>
+          </a:p>
+          <a:p>
+            <a:pPr marL="800100" lvl="1" indent="-342900">
+              <a:buFont typeface="Arial" panose="020B0604020202020204" pitchFamily="34" charset="0"/>
+              <a:buChar char="•"/>
+            </a:pPr>
+            <a:endParaRPr lang="ru-RU" sz="2200" dirty="0" smtClean="0">
+              <a:latin typeface="Gotham Pro" panose="02000503040000020004" pitchFamily="50" charset="0"/>
+              <a:cs typeface="Gotham Pro" panose="02000503040000020004" pitchFamily="50" charset="0"/>
+            </a:endParaRPr>
+          </a:p>
+          <a:p>
+            <a:pPr marL="800100" lvl="1" indent="-342900">
+              <a:buFont typeface="Arial" panose="020B0604020202020204" pitchFamily="34" charset="0"/>
+              <a:buChar char="•"/>
+            </a:pPr>
+            <a:endParaRPr lang="ru-RU" sz="2200" dirty="0">
+              <a:latin typeface="Gotham Pro" panose="02000503040000020004" pitchFamily="50" charset="0"/>
+              <a:cs typeface="Gotham Pro" panose="02000503040000020004" pitchFamily="50" charset="0"/>
+            </a:endParaRPr>
+          </a:p>
+          <a:p>
+            <a:pPr marL="800100" lvl="1" indent="-342900">
+              <a:buFont typeface="Arial" panose="020B0604020202020204" pitchFamily="34" charset="0"/>
+              <a:buChar char="•"/>
+            </a:pPr>
+            <a:endParaRPr lang="ru-RU" sz="2200" dirty="0" smtClean="0">
+              <a:latin typeface="Gotham Pro" panose="02000503040000020004" pitchFamily="50" charset="0"/>
+              <a:cs typeface="Gotham Pro" panose="02000503040000020004" pitchFamily="50" charset="0"/>
+            </a:endParaRPr>
+          </a:p>
+          <a:p>
+            <a:pPr marL="800100" lvl="1" indent="-342900">
+              <a:buFont typeface="Arial" panose="020B0604020202020204" pitchFamily="34" charset="0"/>
+              <a:buChar char="•"/>
+            </a:pPr>
+            <a:endParaRPr lang="ru-RU" sz="2200" dirty="0">
+              <a:latin typeface="Gotham Pro" panose="02000503040000020004" pitchFamily="50" charset="0"/>
+              <a:cs typeface="Gotham Pro" panose="02000503040000020004" pitchFamily="50" charset="0"/>
+            </a:endParaRPr>
+          </a:p>
+          <a:p>
+            <a:pPr marL="800100" lvl="1" indent="-342900">
+              <a:buFont typeface="Arial" panose="020B0604020202020204" pitchFamily="34" charset="0"/>
+              <a:buChar char="•"/>
+            </a:pPr>
+            <a:endParaRPr lang="ru-RU" sz="2200" dirty="0" smtClean="0">
+              <a:latin typeface="Gotham Pro" panose="02000503040000020004" pitchFamily="50" charset="0"/>
+              <a:cs typeface="Gotham Pro" panose="02000503040000020004" pitchFamily="50" charset="0"/>
+            </a:endParaRPr>
+          </a:p>
+          <a:p>
+            <a:pPr marL="800100" lvl="1" indent="-342900">
+              <a:buFont typeface="Arial" panose="020B0604020202020204" pitchFamily="34" charset="0"/>
+              <a:buChar char="•"/>
+            </a:pPr>
+            <a:endParaRPr lang="ru-RU" sz="2200" dirty="0">
+              <a:latin typeface="Gotham Pro" panose="02000503040000020004" pitchFamily="50" charset="0"/>
+              <a:cs typeface="Gotham Pro" panose="02000503040000020004" pitchFamily="50" charset="0"/>
+            </a:endParaRPr>
+          </a:p>
+          <a:p>
+            <a:pPr marL="342900" indent="-342900">
+              <a:buFont typeface="Arial" panose="020B0604020202020204" pitchFamily="34" charset="0"/>
+              <a:buChar char="•"/>
+            </a:pPr>
+            <a:endParaRPr lang="ru-RU" sz="2200" dirty="0">
+              <a:latin typeface="Gotham Pro" panose="02000503040000020004" pitchFamily="50" charset="0"/>
+              <a:cs typeface="Gotham Pro" panose="02000503040000020004" pitchFamily="50" charset="0"/>
+            </a:endParaRPr>
+          </a:p>
+        </p:txBody>
+      </p:sp>
+      <p:sp>
+        <p:nvSpPr>
+          <p:cNvPr id="5" name="TextBox 4"/>
+          <p:cNvSpPr txBox="1"/>
+          <p:nvPr/>
+        </p:nvSpPr>
+        <p:spPr>
+          <a:xfrm>
+            <a:off x="11311128" y="5477256"/>
+            <a:ext cx="607154" cy="369332"/>
+          </a:xfrm>
+          <a:prstGeom prst="rect">
+            <a:avLst/>
+          </a:prstGeom>
+          <a:noFill/>
+        </p:spPr>
+        <p:txBody>
           <a:bodyPr wrap="none" rtlCol="0">
             <a:spAutoFit/>
           </a:bodyPr>
           <a:lstStyle/>
           <a:p>
             <a:r>
+              <a:rPr lang="ru-RU" dirty="0">
+                <a:latin typeface="Gotham Pro" panose="02000503040000020004" pitchFamily="50" charset="0"/>
+                <a:cs typeface="Gotham Pro" panose="02000503040000020004" pitchFamily="50" charset="0"/>
+              </a:rPr>
+              <a:t>5</a:t>
+            </a:r>
+            <a:r>
               <a:rPr lang="ru-RU" dirty="0" smtClean="0">
                 <a:latin typeface="Gotham Pro" panose="02000503040000020004" pitchFamily="50" charset="0"/>
                 <a:cs typeface="Gotham Pro" panose="02000503040000020004" pitchFamily="50" charset="0"/>
               </a:rPr>
-              <a:t>5</a:t>
-            </a:r>
-            <a:r>
-              <a:rPr lang="ru-RU" dirty="0" smtClean="0">
-                <a:latin typeface="Gotham Pro" panose="02000503040000020004" pitchFamily="50" charset="0"/>
-                <a:cs typeface="Gotham Pro" panose="02000503040000020004" pitchFamily="50" charset="0"/>
-              </a:rPr>
-              <a:t>/9</a:t>
+              <a:t>/11</a:t>
             </a:r>
             <a:endParaRPr lang="ru-RU" dirty="0">
               <a:latin typeface="Gotham Pro" panose="02000503040000020004" pitchFamily="50" charset="0"/>
@@ -4685,38 +5238,49 @@
       </p:sp>
       <p:pic>
         <p:nvPicPr>
-          <p:cNvPr id="9" name="Рисунок 8"/>
+          <p:cNvPr id="1026" name="Picture 2" descr="https://www.kaggleusercontent.com/kf/121909589/eyJhbGciOiJkaXIiLCJlbmMiOiJBMTI4Q0JDLUhTMjU2In0..Z3oCKvuE9SAvWTgmh6g_qg.YvbyRu57B0Y_VUhD2ofI05H-xZ8m_pDF0S6UnxOc4gnUmcmdOiI-qQq6B6oEXzrLKzqm_GxcT7-_tCVThUxeIHrZMrZIqxemLq6JAoD4n_c0oYrKWdg0q-U6r7xy_6ZgpQsBTGL3f102OP7TSHClYIg4Tz4a5TXWdJc-YkXZcUZMLaY15m6wqmKJ3sKa6agx1miacs7irxFmZf51fDJ3t3j426WpEI411f7gzhg2rDlet8sXYYW_-gOA1iw0s5AOmDbfDU32pNQfnXiW-oqbRNtLCTgaAlXWKtUsEZBpETis0qPoZUpHlaI0TmoFEOn2F31fEzPpQEvbJqgizKV7blh32GYqaeHn6sOqANocC4MHLzWgvZrXjL71-y84mcmM7Hu7nIr56qS_UKr3foNhBk6GckChdX8-PLdh_KtUclrAhVdx92YWM2F8wMtQxXsFMc1xt4_tPH03IgEoTWw34Qm2i_hfcFGVS6mYAyVM7-a1fQ1DZbd_VMmybaOCNIU-Jihsdd_rLiEFDpC-XOKI0a4bN0o1ycg0VACD9zP8htvOYKn8How9R9SMlR-KqOdc_teDDZfra7_eg1BKl5H0O8BWgOj_d9_zckQzGKLXjEkNjoPe1d5RyOHusvhsblgPBzEbtNC3ztrLskIAXSBxyg.TUG9qlPLejgIpuY0lVZvjw/__results___files/__results___10_0.png"/>
           <p:cNvPicPr>
-            <a:picLocks noChangeAspect="1"/>
+            <a:picLocks noChangeAspect="1" noChangeArrowheads="1"/>
           </p:cNvPicPr>
           <p:nvPr/>
         </p:nvPicPr>
         <p:blipFill>
-          <a:blip r:embed="rId3">
+          <a:blip r:embed="rId4">
             <a:extLst>
               <a:ext uri="{28A0092B-C50C-407E-A947-70E740481C1C}">
                 <a14:useLocalDpi xmlns:a14="http://schemas.microsoft.com/office/drawing/2010/main" val="0"/>
               </a:ext>
             </a:extLst>
           </a:blip>
+          <a:srcRect/>
           <a:stretch>
             <a:fillRect/>
           </a:stretch>
         </p:blipFill>
-        <p:spPr>
+        <p:spPr bwMode="auto">
           <a:xfrm>
-            <a:off x="1342263" y="1675159"/>
-            <a:ext cx="9507474" cy="3220829"/>
+            <a:off x="2493558" y="2403375"/>
+            <a:ext cx="6229817" cy="3630729"/>
           </a:xfrm>
           <a:prstGeom prst="rect">
             <a:avLst/>
           </a:prstGeom>
+          <a:noFill/>
+          <a:extLst>
+            <a:ext uri="{909E8E84-426E-40DD-AFC4-6F175D3DCCD1}">
+              <a14:hiddenFill xmlns:a14="http://schemas.microsoft.com/office/drawing/2010/main">
+                <a:solidFill>
+                  <a:srgbClr val="FFFFFF"/>
+                </a:solidFill>
+              </a14:hiddenFill>
+            </a:ext>
+          </a:extLst>
         </p:spPr>
       </p:pic>
     </p:spTree>
     <p:extLst>
       <p:ext uri="{BB962C8B-B14F-4D97-AF65-F5344CB8AC3E}">
-        <p14:creationId xmlns:p14="http://schemas.microsoft.com/office/powerpoint/2010/main" val="3466070007"/>
+        <p14:creationId xmlns:p14="http://schemas.microsoft.com/office/powerpoint/2010/main" val="2136517990"/>
       </p:ext>
     </p:extLst>
   </p:cSld>
@@ -4795,7 +5359,7 @@
         <p:spPr>
           <a:xfrm>
             <a:off x="457200" y="411480"/>
-            <a:ext cx="6718506" cy="523220"/>
+            <a:ext cx="2659702" cy="523220"/>
           </a:xfrm>
           <a:prstGeom prst="rect">
             <a:avLst/>
@@ -4813,7 +5377,7 @@
                 <a:latin typeface="Montserrat SemiBold" panose="00000700000000000000" pitchFamily="2" charset="0"/>
                 <a:cs typeface="Gotham Pro Medium" panose="02000603030000020004" pitchFamily="50" charset="0"/>
               </a:rPr>
-              <a:t>Шаг 1 - Сбор симптомов пациента</a:t>
+              <a:t>Архитектура</a:t>
             </a:r>
             <a:endParaRPr lang="ru-RU" sz="2800" dirty="0">
               <a:latin typeface="Montserrat SemiBold" panose="00000700000000000000" pitchFamily="2" charset="0"/>
@@ -4830,8 +5394,8 @@
         </p:nvSpPr>
         <p:spPr>
           <a:xfrm>
-            <a:off x="457200" y="1271243"/>
-            <a:ext cx="11265408" cy="4493538"/>
+            <a:off x="11311128" y="5477256"/>
+            <a:ext cx="617477" cy="369332"/>
           </a:xfrm>
           <a:prstGeom prst="rect">
             <a:avLst/>
@@ -4839,255 +5403,66 @@
           <a:noFill/>
         </p:spPr>
         <p:txBody>
-          <a:bodyPr wrap="square" rtlCol="0">
+          <a:bodyPr wrap="none" rtlCol="0">
             <a:spAutoFit/>
           </a:bodyPr>
           <a:lstStyle/>
           <a:p>
-            <a:pPr marL="457200" indent="-457200">
-              <a:buFont typeface="+mj-lt"/>
-              <a:buAutoNum type="arabicPeriod"/>
-            </a:pPr>
-            <a:r>
-              <a:rPr lang="ru-RU" sz="2200" dirty="0" smtClean="0">
-                <a:latin typeface="Gotham Pro" panose="02000503040000020004" pitchFamily="50" charset="0"/>
-                <a:cs typeface="Gotham Pro" panose="02000503040000020004" pitchFamily="50" charset="0"/>
-              </a:rPr>
-              <a:t>Запрос симптомов у пациента на естественном языке</a:t>
-            </a:r>
-          </a:p>
-          <a:p>
-            <a:pPr marL="457200" indent="-457200">
-              <a:buFont typeface="+mj-lt"/>
-              <a:buAutoNum type="arabicPeriod"/>
-            </a:pPr>
-            <a:endParaRPr lang="ru-RU" sz="2200" dirty="0" smtClean="0">
+            <a:r>
+              <a:rPr lang="ru-RU" dirty="0" smtClean="0">
+                <a:latin typeface="Gotham Pro" panose="02000503040000020004" pitchFamily="50" charset="0"/>
+                <a:cs typeface="Gotham Pro" panose="02000503040000020004" pitchFamily="50" charset="0"/>
+              </a:rPr>
+              <a:t>6</a:t>
+            </a:r>
+            <a:r>
+              <a:rPr lang="ru-RU" dirty="0" smtClean="0">
+                <a:latin typeface="Gotham Pro" panose="02000503040000020004" pitchFamily="50" charset="0"/>
+                <a:cs typeface="Gotham Pro" panose="02000503040000020004" pitchFamily="50" charset="0"/>
+              </a:rPr>
+              <a:t>/11</a:t>
+            </a:r>
+            <a:endParaRPr lang="ru-RU" dirty="0">
               <a:latin typeface="Gotham Pro" panose="02000503040000020004" pitchFamily="50" charset="0"/>
               <a:cs typeface="Gotham Pro" panose="02000503040000020004" pitchFamily="50" charset="0"/>
             </a:endParaRPr>
           </a:p>
-          <a:p>
-            <a:pPr marL="457200" indent="-457200">
-              <a:buFont typeface="+mj-lt"/>
-              <a:buAutoNum type="arabicPeriod"/>
-            </a:pPr>
-            <a:r>
-              <a:rPr lang="ru-RU" sz="2200" dirty="0" smtClean="0">
-                <a:latin typeface="Gotham Pro" panose="02000503040000020004" pitchFamily="50" charset="0"/>
-                <a:cs typeface="Gotham Pro" panose="02000503040000020004" pitchFamily="50" charset="0"/>
-              </a:rPr>
-              <a:t>Предварительная обработка</a:t>
-            </a:r>
-          </a:p>
-          <a:p>
-            <a:pPr marL="914400" lvl="1" indent="-457200">
-              <a:buFont typeface="Arial" panose="020B0604020202020204" pitchFamily="34" charset="0"/>
-              <a:buChar char="•"/>
-            </a:pPr>
-            <a:r>
-              <a:rPr lang="ru-RU" sz="2200" dirty="0" smtClean="0">
-                <a:latin typeface="Gotham Pro" panose="02000503040000020004" pitchFamily="50" charset="0"/>
-                <a:cs typeface="Gotham Pro" panose="02000503040000020004" pitchFamily="50" charset="0"/>
-              </a:rPr>
-              <a:t>Удаление знаков пунктуации</a:t>
-            </a:r>
-          </a:p>
-          <a:p>
-            <a:pPr marL="914400" lvl="1" indent="-457200">
-              <a:buFont typeface="Arial" panose="020B0604020202020204" pitchFamily="34" charset="0"/>
-              <a:buChar char="•"/>
-            </a:pPr>
-            <a:r>
-              <a:rPr lang="ru-RU" sz="2200" dirty="0" err="1" smtClean="0">
-                <a:latin typeface="Gotham Pro" panose="02000503040000020004" pitchFamily="50" charset="0"/>
-                <a:cs typeface="Gotham Pro" panose="02000503040000020004" pitchFamily="50" charset="0"/>
-              </a:rPr>
-              <a:t>Лемматизация</a:t>
-            </a:r>
-            <a:r>
-              <a:rPr lang="ru-RU" sz="2200" dirty="0" smtClean="0">
-                <a:latin typeface="Gotham Pro" panose="02000503040000020004" pitchFamily="50" charset="0"/>
-                <a:cs typeface="Gotham Pro" panose="02000503040000020004" pitchFamily="50" charset="0"/>
-              </a:rPr>
-              <a:t> слов</a:t>
-            </a:r>
-          </a:p>
-          <a:p>
-            <a:pPr marL="914400" lvl="1" indent="-457200">
-              <a:buFont typeface="+mj-lt"/>
-              <a:buAutoNum type="arabicPeriod"/>
-            </a:pPr>
-            <a:endParaRPr lang="ru-RU" sz="2200" dirty="0" smtClean="0">
-              <a:latin typeface="Gotham Pro" panose="02000503040000020004" pitchFamily="50" charset="0"/>
-              <a:cs typeface="Gotham Pro" panose="02000503040000020004" pitchFamily="50" charset="0"/>
-            </a:endParaRPr>
-          </a:p>
-          <a:p>
-            <a:pPr marL="457200" indent="-457200">
-              <a:buFont typeface="+mj-lt"/>
-              <a:buAutoNum type="arabicPeriod"/>
-            </a:pPr>
-            <a:r>
-              <a:rPr lang="ru-RU" sz="2200" dirty="0" smtClean="0">
-                <a:latin typeface="Gotham Pro" panose="02000503040000020004" pitchFamily="50" charset="0"/>
-                <a:cs typeface="Gotham Pro" panose="02000503040000020004" pitchFamily="50" charset="0"/>
-              </a:rPr>
-              <a:t>Выделение симптомов из текста</a:t>
-            </a:r>
-          </a:p>
-          <a:p>
-            <a:pPr marL="914400" lvl="1" indent="-457200">
-              <a:buFont typeface="+mj-lt"/>
-              <a:buAutoNum type="arabicPeriod"/>
-            </a:pPr>
-            <a:r>
-              <a:rPr lang="en-US" sz="2200" dirty="0" err="1" smtClean="0">
-                <a:latin typeface="Gotham Pro" panose="02000503040000020004" pitchFamily="50" charset="0"/>
-                <a:cs typeface="Gotham Pro" panose="02000503040000020004" pitchFamily="50" charset="0"/>
-              </a:rPr>
-              <a:t>SpaCy</a:t>
-            </a:r>
-            <a:r>
-              <a:rPr lang="en-US" sz="2200" dirty="0" smtClean="0">
-                <a:latin typeface="Gotham Pro" panose="02000503040000020004" pitchFamily="50" charset="0"/>
-                <a:cs typeface="Gotham Pro" panose="02000503040000020004" pitchFamily="50" charset="0"/>
-              </a:rPr>
-              <a:t> </a:t>
-            </a:r>
-            <a:r>
-              <a:rPr lang="ru-RU" sz="2200" dirty="0" smtClean="0">
-                <a:latin typeface="Gotham Pro" panose="02000503040000020004" pitchFamily="50" charset="0"/>
-                <a:cs typeface="Gotham Pro" panose="02000503040000020004" pitchFamily="50" charset="0"/>
-              </a:rPr>
-              <a:t>библиотека</a:t>
-            </a:r>
-          </a:p>
-          <a:p>
-            <a:pPr marL="914400" lvl="1" indent="-457200">
-              <a:buFont typeface="+mj-lt"/>
-              <a:buAutoNum type="arabicPeriod"/>
-            </a:pPr>
-            <a:r>
-              <a:rPr lang="ru-RU" sz="2200" dirty="0" smtClean="0">
-                <a:latin typeface="Gotham Pro" panose="02000503040000020004" pitchFamily="50" charset="0"/>
-                <a:cs typeface="Gotham Pro" panose="02000503040000020004" pitchFamily="50" charset="0"/>
-              </a:rPr>
-              <a:t>Выделение симптомов по заданным правилам </a:t>
-            </a:r>
-          </a:p>
-          <a:p>
-            <a:pPr marL="457200" indent="-457200">
-              <a:buFont typeface="+mj-lt"/>
-              <a:buAutoNum type="arabicPeriod"/>
-            </a:pPr>
-            <a:endParaRPr lang="ru-RU" sz="2200" dirty="0">
-              <a:latin typeface="Gotham Pro" panose="02000503040000020004" pitchFamily="50" charset="0"/>
-              <a:cs typeface="Gotham Pro" panose="02000503040000020004" pitchFamily="50" charset="0"/>
-            </a:endParaRPr>
-          </a:p>
-          <a:p>
-            <a:pPr marL="457200" indent="-457200">
-              <a:buFont typeface="+mj-lt"/>
-              <a:buAutoNum type="arabicPeriod"/>
-            </a:pPr>
-            <a:r>
-              <a:rPr lang="ru-RU" sz="2200" dirty="0" smtClean="0">
-                <a:latin typeface="Gotham Pro" panose="02000503040000020004" pitchFamily="50" charset="0"/>
-                <a:cs typeface="Gotham Pro" panose="02000503040000020004" pitchFamily="50" charset="0"/>
-              </a:rPr>
-              <a:t>Обработка отрицаний симптомов с помощью библиотеки</a:t>
-            </a:r>
-            <a:r>
-              <a:rPr lang="en-US" sz="2200" dirty="0" smtClean="0">
-                <a:latin typeface="Gotham Pro" panose="02000503040000020004" pitchFamily="50" charset="0"/>
-                <a:cs typeface="Gotham Pro" panose="02000503040000020004" pitchFamily="50" charset="0"/>
-              </a:rPr>
-              <a:t> </a:t>
-            </a:r>
-            <a:r>
-              <a:rPr lang="en-US" sz="2200" dirty="0" err="1" smtClean="0">
-                <a:latin typeface="Gotham Pro" panose="02000503040000020004" pitchFamily="50" charset="0"/>
-                <a:cs typeface="Gotham Pro" panose="02000503040000020004" pitchFamily="50" charset="0"/>
-              </a:rPr>
-              <a:t>Negspacy</a:t>
-            </a:r>
-            <a:endParaRPr lang="ru-RU" sz="2200" dirty="0" smtClean="0">
-              <a:latin typeface="Gotham Pro" panose="02000503040000020004" pitchFamily="50" charset="0"/>
-              <a:cs typeface="Gotham Pro" panose="02000503040000020004" pitchFamily="50" charset="0"/>
-            </a:endParaRPr>
-          </a:p>
-          <a:p>
-            <a:pPr marL="457200" indent="-457200">
-              <a:buFont typeface="+mj-lt"/>
-              <a:buAutoNum type="arabicPeriod"/>
-            </a:pPr>
-            <a:endParaRPr lang="ru-RU" sz="2200" dirty="0">
-              <a:latin typeface="Gotham Pro" panose="02000503040000020004" pitchFamily="50" charset="0"/>
-              <a:cs typeface="Gotham Pro" panose="02000503040000020004" pitchFamily="50" charset="0"/>
-            </a:endParaRPr>
-          </a:p>
-          <a:p>
-            <a:pPr marL="457200" indent="-457200">
-              <a:buFont typeface="+mj-lt"/>
-              <a:buAutoNum type="arabicPeriod"/>
-            </a:pPr>
-            <a:r>
-              <a:rPr lang="ru-RU" sz="2200" dirty="0" smtClean="0">
-                <a:latin typeface="Gotham Pro" panose="02000503040000020004" pitchFamily="50" charset="0"/>
-                <a:cs typeface="Gotham Pro" panose="02000503040000020004" pitchFamily="50" charset="0"/>
-              </a:rPr>
-              <a:t>Получаем векторное представление симптомов пациента</a:t>
-            </a:r>
-          </a:p>
-        </p:txBody>
-      </p:sp>
-      <p:sp>
-        <p:nvSpPr>
-          <p:cNvPr id="7" name="TextBox 6"/>
-          <p:cNvSpPr txBox="1"/>
+        </p:txBody>
+      </p:sp>
+      <p:pic>
+        <p:nvPicPr>
+          <p:cNvPr id="9" name="Рисунок 8"/>
+          <p:cNvPicPr>
+            <a:picLocks noChangeAspect="1"/>
+          </p:cNvPicPr>
           <p:nvPr/>
-        </p:nvSpPr>
+        </p:nvPicPr>
+        <p:blipFill>
+          <a:blip r:embed="rId3">
+            <a:extLst>
+              <a:ext uri="{28A0092B-C50C-407E-A947-70E740481C1C}">
+                <a14:useLocalDpi xmlns:a14="http://schemas.microsoft.com/office/drawing/2010/main" val="0"/>
+              </a:ext>
+            </a:extLst>
+          </a:blip>
+          <a:stretch>
+            <a:fillRect/>
+          </a:stretch>
+        </p:blipFill>
         <p:spPr>
           <a:xfrm>
-            <a:off x="11311128" y="5477256"/>
-            <a:ext cx="592919" cy="369332"/>
+            <a:off x="1342263" y="1675159"/>
+            <a:ext cx="9507474" cy="3220829"/>
           </a:xfrm>
           <a:prstGeom prst="rect">
             <a:avLst/>
           </a:prstGeom>
-          <a:noFill/>
         </p:spPr>
-        <p:txBody>
-          <a:bodyPr wrap="none" rtlCol="0">
-            <a:spAutoFit/>
-          </a:bodyPr>
-          <a:lstStyle/>
-          <a:p>
-            <a:r>
-              <a:rPr lang="ru-RU" dirty="0" smtClean="0">
-                <a:latin typeface="Gotham Pro" panose="02000503040000020004" pitchFamily="50" charset="0"/>
-                <a:cs typeface="Gotham Pro" panose="02000503040000020004" pitchFamily="50" charset="0"/>
-              </a:rPr>
-              <a:t>6</a:t>
-            </a:r>
-            <a:r>
-              <a:rPr lang="ru-RU" dirty="0" smtClean="0">
-                <a:latin typeface="Gotham Pro" panose="02000503040000020004" pitchFamily="50" charset="0"/>
-                <a:cs typeface="Gotham Pro" panose="02000503040000020004" pitchFamily="50" charset="0"/>
-              </a:rPr>
-              <a:t>/9</a:t>
-            </a:r>
-            <a:endParaRPr lang="ru-RU" dirty="0">
-              <a:latin typeface="Gotham Pro" panose="02000503040000020004" pitchFamily="50" charset="0"/>
-              <a:cs typeface="Gotham Pro" panose="02000503040000020004" pitchFamily="50" charset="0"/>
-            </a:endParaRPr>
-          </a:p>
-        </p:txBody>
-      </p:sp>
+      </p:pic>
     </p:spTree>
     <p:extLst>
       <p:ext uri="{BB962C8B-B14F-4D97-AF65-F5344CB8AC3E}">
-        <p14:creationId xmlns:p14="http://schemas.microsoft.com/office/powerpoint/2010/main" val="2736745006"/>
+        <p14:creationId xmlns:p14="http://schemas.microsoft.com/office/powerpoint/2010/main" val="3466070007"/>
       </p:ext>
     </p:extLst>
   </p:cSld>
@@ -5166,7 +5541,7 @@
         <p:spPr>
           <a:xfrm>
             <a:off x="457200" y="411480"/>
-            <a:ext cx="9990235" cy="523220"/>
+            <a:ext cx="6718506" cy="523220"/>
           </a:xfrm>
           <a:prstGeom prst="rect">
             <a:avLst/>
@@ -5184,21 +5559,7 @@
                 <a:latin typeface="Montserrat SemiBold" panose="00000700000000000000" pitchFamily="2" charset="0"/>
                 <a:cs typeface="Gotham Pro Medium" panose="02000603030000020004" pitchFamily="50" charset="0"/>
               </a:rPr>
-              <a:t>Шаг 2 – Определение</a:t>
-            </a:r>
-            <a:r>
-              <a:rPr lang="en-US" sz="2800" dirty="0" smtClean="0">
-                <a:latin typeface="Montserrat SemiBold" panose="00000700000000000000" pitchFamily="2" charset="0"/>
-                <a:cs typeface="Gotham Pro Medium" panose="02000603030000020004" pitchFamily="50" charset="0"/>
-              </a:rPr>
-              <a:t> </a:t>
-            </a:r>
-            <a:r>
-              <a:rPr lang="ru-RU" sz="2800" dirty="0" smtClean="0">
-                <a:latin typeface="Montserrat SemiBold" panose="00000700000000000000" pitchFamily="2" charset="0"/>
-                <a:cs typeface="Gotham Pro Medium" panose="02000603030000020004" pitchFamily="50" charset="0"/>
-              </a:rPr>
-              <a:t>предварительного диагноза</a:t>
+              <a:t>Шаг 1 - Сбор симптомов пациента</a:t>
             </a:r>
             <a:endParaRPr lang="ru-RU" sz="2800" dirty="0">
               <a:latin typeface="Montserrat SemiBold" panose="00000700000000000000" pitchFamily="2" charset="0"/>
@@ -5216,7 +5577,7 @@
         <p:spPr>
           <a:xfrm>
             <a:off x="457200" y="1271243"/>
-            <a:ext cx="11265408" cy="4832092"/>
+            <a:ext cx="11265408" cy="4493538"/>
           </a:xfrm>
           <a:prstGeom prst="rect">
             <a:avLst/>
@@ -5229,29 +5590,152 @@
           </a:bodyPr>
           <a:lstStyle/>
           <a:p>
-            <a:pPr marL="342900" indent="-342900">
+            <a:pPr marL="457200" indent="-457200">
+              <a:buFont typeface="+mj-lt"/>
+              <a:buAutoNum type="arabicPeriod"/>
+            </a:pPr>
+            <a:r>
+              <a:rPr lang="ru-RU" sz="2200" dirty="0" smtClean="0">
+                <a:latin typeface="Gotham Pro" panose="02000503040000020004" pitchFamily="50" charset="0"/>
+                <a:cs typeface="Gotham Pro" panose="02000503040000020004" pitchFamily="50" charset="0"/>
+              </a:rPr>
+              <a:t>Запрос симптомов у пациента на естественном языке</a:t>
+            </a:r>
+          </a:p>
+          <a:p>
+            <a:pPr marL="457200" indent="-457200">
+              <a:buFont typeface="+mj-lt"/>
+              <a:buAutoNum type="arabicPeriod"/>
+            </a:pPr>
+            <a:endParaRPr lang="ru-RU" sz="2200" dirty="0" smtClean="0">
+              <a:latin typeface="Gotham Pro" panose="02000503040000020004" pitchFamily="50" charset="0"/>
+              <a:cs typeface="Gotham Pro" panose="02000503040000020004" pitchFamily="50" charset="0"/>
+            </a:endParaRPr>
+          </a:p>
+          <a:p>
+            <a:pPr marL="457200" indent="-457200">
+              <a:buFont typeface="+mj-lt"/>
+              <a:buAutoNum type="arabicPeriod"/>
+            </a:pPr>
+            <a:r>
+              <a:rPr lang="ru-RU" sz="2200" dirty="0" smtClean="0">
+                <a:latin typeface="Gotham Pro" panose="02000503040000020004" pitchFamily="50" charset="0"/>
+                <a:cs typeface="Gotham Pro" panose="02000503040000020004" pitchFamily="50" charset="0"/>
+              </a:rPr>
+              <a:t>Предварительная обработка</a:t>
+            </a:r>
+          </a:p>
+          <a:p>
+            <a:pPr marL="914400" lvl="1" indent="-457200">
               <a:buFont typeface="Arial" panose="020B0604020202020204" pitchFamily="34" charset="0"/>
               <a:buChar char="•"/>
             </a:pPr>
             <a:r>
-              <a:rPr lang="en-US" sz="2200" dirty="0" smtClean="0">
-                <a:latin typeface="Gotham Pro" panose="02000503040000020004" pitchFamily="50" charset="0"/>
-                <a:cs typeface="Gotham Pro" panose="02000503040000020004" pitchFamily="50" charset="0"/>
-              </a:rPr>
-              <a:t>ML </a:t>
-            </a:r>
-            <a:r>
               <a:rPr lang="ru-RU" sz="2200" dirty="0" smtClean="0">
                 <a:latin typeface="Gotham Pro" panose="02000503040000020004" pitchFamily="50" charset="0"/>
                 <a:cs typeface="Gotham Pro" panose="02000503040000020004" pitchFamily="50" charset="0"/>
               </a:rPr>
-              <a:t>модель предсказывает предварительный диагноз</a:t>
-            </a:r>
-          </a:p>
-          <a:p>
-            <a:pPr marL="342900" indent="-342900">
+              <a:t>Удаление знаков пунктуации</a:t>
+            </a:r>
+          </a:p>
+          <a:p>
+            <a:pPr marL="914400" lvl="1" indent="-457200">
               <a:buFont typeface="Arial" panose="020B0604020202020204" pitchFamily="34" charset="0"/>
               <a:buChar char="•"/>
+            </a:pPr>
+            <a:r>
+              <a:rPr lang="ru-RU" sz="2200" dirty="0" err="1" smtClean="0">
+                <a:latin typeface="Gotham Pro" panose="02000503040000020004" pitchFamily="50" charset="0"/>
+                <a:cs typeface="Gotham Pro" panose="02000503040000020004" pitchFamily="50" charset="0"/>
+              </a:rPr>
+              <a:t>Лемматизация</a:t>
+            </a:r>
+            <a:r>
+              <a:rPr lang="ru-RU" sz="2200" dirty="0" smtClean="0">
+                <a:latin typeface="Gotham Pro" panose="02000503040000020004" pitchFamily="50" charset="0"/>
+                <a:cs typeface="Gotham Pro" panose="02000503040000020004" pitchFamily="50" charset="0"/>
+              </a:rPr>
+              <a:t> слов</a:t>
+            </a:r>
+          </a:p>
+          <a:p>
+            <a:pPr marL="914400" lvl="1" indent="-457200">
+              <a:buFont typeface="+mj-lt"/>
+              <a:buAutoNum type="arabicPeriod"/>
+            </a:pPr>
+            <a:endParaRPr lang="ru-RU" sz="2200" dirty="0" smtClean="0">
+              <a:latin typeface="Gotham Pro" panose="02000503040000020004" pitchFamily="50" charset="0"/>
+              <a:cs typeface="Gotham Pro" panose="02000503040000020004" pitchFamily="50" charset="0"/>
+            </a:endParaRPr>
+          </a:p>
+          <a:p>
+            <a:pPr marL="457200" indent="-457200">
+              <a:buFont typeface="+mj-lt"/>
+              <a:buAutoNum type="arabicPeriod"/>
+            </a:pPr>
+            <a:r>
+              <a:rPr lang="ru-RU" sz="2200" dirty="0" smtClean="0">
+                <a:latin typeface="Gotham Pro" panose="02000503040000020004" pitchFamily="50" charset="0"/>
+                <a:cs typeface="Gotham Pro" panose="02000503040000020004" pitchFamily="50" charset="0"/>
+              </a:rPr>
+              <a:t>Выделение симптомов из текста</a:t>
+            </a:r>
+          </a:p>
+          <a:p>
+            <a:pPr marL="914400" lvl="1" indent="-457200">
+              <a:buFont typeface="+mj-lt"/>
+              <a:buAutoNum type="arabicPeriod"/>
+            </a:pPr>
+            <a:r>
+              <a:rPr lang="en-US" sz="2200" dirty="0" err="1" smtClean="0">
+                <a:latin typeface="Gotham Pro" panose="02000503040000020004" pitchFamily="50" charset="0"/>
+                <a:cs typeface="Gotham Pro" panose="02000503040000020004" pitchFamily="50" charset="0"/>
+              </a:rPr>
+              <a:t>SpaCy</a:t>
+            </a:r>
+            <a:r>
+              <a:rPr lang="en-US" sz="2200" dirty="0" smtClean="0">
+                <a:latin typeface="Gotham Pro" panose="02000503040000020004" pitchFamily="50" charset="0"/>
+                <a:cs typeface="Gotham Pro" panose="02000503040000020004" pitchFamily="50" charset="0"/>
+              </a:rPr>
+              <a:t> </a:t>
+            </a:r>
+            <a:r>
+              <a:rPr lang="ru-RU" sz="2200" dirty="0" smtClean="0">
+                <a:latin typeface="Gotham Pro" panose="02000503040000020004" pitchFamily="50" charset="0"/>
+                <a:cs typeface="Gotham Pro" panose="02000503040000020004" pitchFamily="50" charset="0"/>
+              </a:rPr>
+              <a:t>библиотека</a:t>
+            </a:r>
+          </a:p>
+          <a:p>
+            <a:pPr marL="914400" lvl="1" indent="-457200">
+              <a:buFont typeface="+mj-lt"/>
+              <a:buAutoNum type="arabicPeriod"/>
+            </a:pPr>
+            <a:r>
+              <a:rPr lang="ru-RU" sz="2200" dirty="0" smtClean="0">
+                <a:latin typeface="Gotham Pro" panose="02000503040000020004" pitchFamily="50" charset="0"/>
+                <a:cs typeface="Gotham Pro" panose="02000503040000020004" pitchFamily="50" charset="0"/>
+              </a:rPr>
+              <a:t>Выделение симптомов по заданным правилам </a:t>
+            </a:r>
+            <a:r>
+              <a:rPr lang="ru-RU" sz="2200" dirty="0" smtClean="0">
+                <a:latin typeface="Gotham Pro" panose="02000503040000020004" pitchFamily="50" charset="0"/>
+                <a:cs typeface="Gotham Pro" panose="02000503040000020004" pitchFamily="50" charset="0"/>
+              </a:rPr>
+              <a:t>– 5213 симптома</a:t>
+            </a:r>
+            <a:endParaRPr lang="ru-RU" sz="2200" dirty="0" smtClean="0">
+              <a:latin typeface="Gotham Pro" panose="02000503040000020004" pitchFamily="50" charset="0"/>
+              <a:cs typeface="Gotham Pro" panose="02000503040000020004" pitchFamily="50" charset="0"/>
+            </a:endParaRPr>
+          </a:p>
+          <a:p>
+            <a:pPr marL="457200" indent="-457200">
+              <a:buFont typeface="+mj-lt"/>
+              <a:buAutoNum type="arabicPeriod"/>
             </a:pPr>
             <a:endParaRPr lang="ru-RU" sz="2200" dirty="0">
               <a:latin typeface="Gotham Pro" panose="02000503040000020004" pitchFamily="50" charset="0"/>
@@ -5259,192 +5743,71 @@
             </a:endParaRPr>
           </a:p>
           <a:p>
-            <a:pPr marL="342900" indent="-342900">
-              <a:buFont typeface="Arial" panose="020B0604020202020204" pitchFamily="34" charset="0"/>
-              <a:buChar char="•"/>
+            <a:pPr marL="457200" indent="-457200">
+              <a:buFont typeface="+mj-lt"/>
+              <a:buAutoNum type="arabicPeriod"/>
             </a:pPr>
             <a:r>
               <a:rPr lang="ru-RU" sz="2200" dirty="0" smtClean="0">
                 <a:latin typeface="Gotham Pro" panose="02000503040000020004" pitchFamily="50" charset="0"/>
                 <a:cs typeface="Gotham Pro" panose="02000503040000020004" pitchFamily="50" charset="0"/>
               </a:rPr>
-              <a:t>При предсказании диагноза важна интерпретируемость</a:t>
-            </a:r>
-          </a:p>
-          <a:p>
-            <a:pPr marL="800100" lvl="1" indent="-342900">
-              <a:buFont typeface="Arial" panose="020B0604020202020204" pitchFamily="34" charset="0"/>
-              <a:buChar char="•"/>
-            </a:pPr>
-            <a:r>
-              <a:rPr lang="ru-RU" sz="2200" dirty="0" smtClean="0">
-                <a:latin typeface="Gotham Pro" panose="02000503040000020004" pitchFamily="50" charset="0"/>
-                <a:cs typeface="Gotham Pro" panose="02000503040000020004" pitchFamily="50" charset="0"/>
-              </a:rPr>
-              <a:t>Логистическая регрессия</a:t>
-            </a:r>
-          </a:p>
-          <a:p>
-            <a:pPr marL="800100" lvl="1" indent="-342900">
-              <a:buFont typeface="Arial" panose="020B0604020202020204" pitchFamily="34" charset="0"/>
-              <a:buChar char="•"/>
-            </a:pPr>
-            <a:r>
-              <a:rPr lang="ru-RU" sz="2200" dirty="0" smtClean="0">
-                <a:latin typeface="Gotham Pro" panose="02000503040000020004" pitchFamily="50" charset="0"/>
-                <a:cs typeface="Gotham Pro" panose="02000503040000020004" pitchFamily="50" charset="0"/>
-              </a:rPr>
-              <a:t>Что-то более сложное</a:t>
-            </a:r>
-          </a:p>
-          <a:p>
-            <a:endParaRPr lang="ru-RU" sz="2200" dirty="0">
-              <a:latin typeface="Gotham Pro" panose="02000503040000020004" pitchFamily="50" charset="0"/>
-              <a:cs typeface="Gotham Pro" panose="02000503040000020004" pitchFamily="50" charset="0"/>
-            </a:endParaRPr>
-          </a:p>
-          <a:p>
-            <a:pPr marL="342900" indent="-342900">
-              <a:buFont typeface="Arial" panose="020B0604020202020204" pitchFamily="34" charset="0"/>
-              <a:buChar char="•"/>
-            </a:pPr>
-            <a:r>
-              <a:rPr lang="ru-RU" sz="2200" dirty="0" smtClean="0">
-                <a:latin typeface="Gotham Pro" panose="02000503040000020004" pitchFamily="50" charset="0"/>
-                <a:cs typeface="Gotham Pro" panose="02000503040000020004" pitchFamily="50" charset="0"/>
-              </a:rPr>
-              <a:t>Если модель не уверена в предсказании, то агент уточняет наличие необходимых симптомов</a:t>
-            </a:r>
-          </a:p>
-          <a:p>
+              <a:t>Обработка отрицаний симптомов с помощью библиотеки</a:t>
+            </a:r>
+            <a:r>
+              <a:rPr lang="en-US" sz="2200" dirty="0" smtClean="0">
+                <a:latin typeface="Gotham Pro" panose="02000503040000020004" pitchFamily="50" charset="0"/>
+                <a:cs typeface="Gotham Pro" panose="02000503040000020004" pitchFamily="50" charset="0"/>
+              </a:rPr>
+              <a:t> </a:t>
+            </a:r>
+            <a:r>
+              <a:rPr lang="en-US" sz="2200" dirty="0" err="1" smtClean="0">
+                <a:latin typeface="Gotham Pro" panose="02000503040000020004" pitchFamily="50" charset="0"/>
+                <a:cs typeface="Gotham Pro" panose="02000503040000020004" pitchFamily="50" charset="0"/>
+              </a:rPr>
+              <a:t>Negspacy</a:t>
+            </a:r>
             <a:endParaRPr lang="ru-RU" sz="2200" dirty="0" smtClean="0">
               <a:latin typeface="Gotham Pro" panose="02000503040000020004" pitchFamily="50" charset="0"/>
               <a:cs typeface="Gotham Pro" panose="02000503040000020004" pitchFamily="50" charset="0"/>
             </a:endParaRPr>
           </a:p>
           <a:p>
-            <a:pPr marL="342900" indent="-342900">
-              <a:buFont typeface="Arial" panose="020B0604020202020204" pitchFamily="34" charset="0"/>
-              <a:buChar char="•"/>
-            </a:pPr>
-            <a:r>
-              <a:rPr lang="ru-RU" sz="2200" dirty="0" smtClean="0">
-                <a:latin typeface="Gotham Pro" panose="02000503040000020004" pitchFamily="50" charset="0"/>
-                <a:cs typeface="Gotham Pro" panose="02000503040000020004" pitchFamily="50" charset="0"/>
-              </a:rPr>
-              <a:t>Данные для обучения и </a:t>
-            </a:r>
-            <a:r>
-              <a:rPr lang="ru-RU" sz="2200" dirty="0" err="1" smtClean="0">
-                <a:latin typeface="Gotham Pro" panose="02000503040000020004" pitchFamily="50" charset="0"/>
-                <a:cs typeface="Gotham Pro" panose="02000503040000020004" pitchFamily="50" charset="0"/>
-              </a:rPr>
-              <a:t>валидации</a:t>
-            </a:r>
-            <a:endParaRPr lang="ru-RU" sz="2200" dirty="0" smtClean="0">
-              <a:latin typeface="Gotham Pro" panose="02000503040000020004" pitchFamily="50" charset="0"/>
-              <a:cs typeface="Gotham Pro" panose="02000503040000020004" pitchFamily="50" charset="0"/>
-            </a:endParaRPr>
-          </a:p>
-          <a:p>
-            <a:pPr marL="800100" lvl="1" indent="-342900">
-              <a:buFont typeface="Arial" panose="020B0604020202020204" pitchFamily="34" charset="0"/>
-              <a:buChar char="•"/>
-            </a:pPr>
-            <a:r>
-              <a:rPr lang="ru-RU" sz="2200" dirty="0" smtClean="0">
-                <a:latin typeface="Gotham Pro" panose="02000503040000020004" pitchFamily="50" charset="0"/>
-                <a:cs typeface="Gotham Pro" panose="02000503040000020004" pitchFamily="50" charset="0"/>
-              </a:rPr>
-              <a:t>Собранный </a:t>
-            </a:r>
-            <a:r>
-              <a:rPr lang="ru-RU" sz="2200" dirty="0" err="1" smtClean="0">
-                <a:latin typeface="Gotham Pro" panose="02000503040000020004" pitchFamily="50" charset="0"/>
-                <a:cs typeface="Gotham Pro" panose="02000503040000020004" pitchFamily="50" charset="0"/>
-              </a:rPr>
-              <a:t>датасет</a:t>
-            </a:r>
-            <a:r>
-              <a:rPr lang="ru-RU" sz="2200" dirty="0" smtClean="0">
-                <a:latin typeface="Gotham Pro" panose="02000503040000020004" pitchFamily="50" charset="0"/>
-                <a:cs typeface="Gotham Pro" panose="02000503040000020004" pitchFamily="50" charset="0"/>
-              </a:rPr>
-              <a:t> симптомов и болезней на </a:t>
-            </a:r>
-            <a:r>
-              <a:rPr lang="en-US" sz="2200" dirty="0">
-                <a:latin typeface="Gotham Pro" panose="02000503040000020004" pitchFamily="50" charset="0"/>
-                <a:cs typeface="Gotham Pro" panose="02000503040000020004" pitchFamily="50" charset="0"/>
-                <a:hlinkClick r:id="rId3"/>
-              </a:rPr>
-              <a:t>K</a:t>
-            </a:r>
-            <a:r>
-              <a:rPr lang="en-US" sz="2200" dirty="0" smtClean="0">
-                <a:latin typeface="Gotham Pro" panose="02000503040000020004" pitchFamily="50" charset="0"/>
-                <a:cs typeface="Gotham Pro" panose="02000503040000020004" pitchFamily="50" charset="0"/>
-                <a:hlinkClick r:id="rId3"/>
-              </a:rPr>
-              <a:t>aggle</a:t>
-            </a:r>
-            <a:endParaRPr lang="ru-RU" sz="2200" dirty="0">
-              <a:latin typeface="Gotham Pro" panose="02000503040000020004" pitchFamily="50" charset="0"/>
-              <a:cs typeface="Gotham Pro" panose="02000503040000020004" pitchFamily="50" charset="0"/>
-            </a:endParaRPr>
-          </a:p>
-          <a:p>
-            <a:pPr marL="800100" lvl="1" indent="-342900">
-              <a:buFont typeface="Arial" panose="020B0604020202020204" pitchFamily="34" charset="0"/>
-              <a:buChar char="•"/>
-            </a:pPr>
-            <a:r>
-              <a:rPr lang="ru-RU" sz="2200" dirty="0" smtClean="0">
-                <a:latin typeface="Gotham Pro" panose="02000503040000020004" pitchFamily="50" charset="0"/>
-                <a:cs typeface="Gotham Pro" panose="02000503040000020004" pitchFamily="50" charset="0"/>
-              </a:rPr>
-              <a:t>Априорные знания о болезнях и их симптомах</a:t>
-            </a:r>
-          </a:p>
-          <a:p>
-            <a:pPr marL="800100" lvl="1" indent="-342900">
-              <a:buFont typeface="Arial" panose="020B0604020202020204" pitchFamily="34" charset="0"/>
-              <a:buChar char="•"/>
-            </a:pPr>
-            <a:r>
-              <a:rPr lang="ru-RU" sz="2200" dirty="0" smtClean="0">
-                <a:latin typeface="Gotham Pro" panose="02000503040000020004" pitchFamily="50" charset="0"/>
-                <a:cs typeface="Gotham Pro" panose="02000503040000020004" pitchFamily="50" charset="0"/>
-              </a:rPr>
-              <a:t>Слабоструктурированные данные с медицинских форумов</a:t>
-            </a:r>
-            <a:endParaRPr lang="ru-RU" sz="2200" dirty="0">
-              <a:latin typeface="Gotham Pro" panose="02000503040000020004" pitchFamily="50" charset="0"/>
-              <a:cs typeface="Gotham Pro" panose="02000503040000020004" pitchFamily="50" charset="0"/>
-            </a:endParaRPr>
-          </a:p>
-          <a:p>
-            <a:pPr marL="342900" indent="-342900">
-              <a:buFont typeface="Arial" panose="020B0604020202020204" pitchFamily="34" charset="0"/>
-              <a:buChar char="•"/>
+            <a:pPr marL="457200" indent="-457200">
+              <a:buFont typeface="+mj-lt"/>
+              <a:buAutoNum type="arabicPeriod"/>
             </a:pPr>
             <a:endParaRPr lang="ru-RU" sz="2200" dirty="0">
               <a:latin typeface="Gotham Pro" panose="02000503040000020004" pitchFamily="50" charset="0"/>
               <a:cs typeface="Gotham Pro" panose="02000503040000020004" pitchFamily="50" charset="0"/>
             </a:endParaRPr>
           </a:p>
-        </p:txBody>
-      </p:sp>
-      <p:sp>
-        <p:nvSpPr>
-          <p:cNvPr id="5" name="TextBox 4"/>
+          <a:p>
+            <a:pPr marL="457200" indent="-457200">
+              <a:buFont typeface="+mj-lt"/>
+              <a:buAutoNum type="arabicPeriod"/>
+            </a:pPr>
+            <a:r>
+              <a:rPr lang="ru-RU" sz="2200" dirty="0" smtClean="0">
+                <a:latin typeface="Gotham Pro" panose="02000503040000020004" pitchFamily="50" charset="0"/>
+                <a:cs typeface="Gotham Pro" panose="02000503040000020004" pitchFamily="50" charset="0"/>
+              </a:rPr>
+              <a:t>Получаем векторное представление симптомов пациента</a:t>
+            </a:r>
+          </a:p>
+        </p:txBody>
+      </p:sp>
+      <p:sp>
+        <p:nvSpPr>
+          <p:cNvPr id="7" name="TextBox 6"/>
           <p:cNvSpPr txBox="1"/>
           <p:nvPr/>
         </p:nvSpPr>
         <p:spPr>
           <a:xfrm>
             <a:off x="11311128" y="5477256"/>
-            <a:ext cx="551689" cy="369332"/>
+            <a:ext cx="576248" cy="369332"/>
           </a:xfrm>
           <a:prstGeom prst="rect">
             <a:avLst/>
@@ -5462,14 +5825,7 @@
                 <a:latin typeface="Gotham Pro" panose="02000503040000020004" pitchFamily="50" charset="0"/>
                 <a:cs typeface="Gotham Pro" panose="02000503040000020004" pitchFamily="50" charset="0"/>
               </a:rPr>
-              <a:t>7</a:t>
-            </a:r>
-            <a:r>
-              <a:rPr lang="ru-RU" dirty="0" smtClean="0">
-                <a:latin typeface="Gotham Pro" panose="02000503040000020004" pitchFamily="50" charset="0"/>
-                <a:cs typeface="Gotham Pro" panose="02000503040000020004" pitchFamily="50" charset="0"/>
-              </a:rPr>
-              <a:t>/9</a:t>
+              <a:t>7/11</a:t>
             </a:r>
             <a:endParaRPr lang="ru-RU" dirty="0">
               <a:latin typeface="Gotham Pro" panose="02000503040000020004" pitchFamily="50" charset="0"/>
@@ -5481,7 +5837,7 @@
     </p:spTree>
     <p:extLst>
       <p:ext uri="{BB962C8B-B14F-4D97-AF65-F5344CB8AC3E}">
-        <p14:creationId xmlns:p14="http://schemas.microsoft.com/office/powerpoint/2010/main" val="2779089913"/>
+        <p14:creationId xmlns:p14="http://schemas.microsoft.com/office/powerpoint/2010/main" val="2736745006"/>
       </p:ext>
     </p:extLst>
   </p:cSld>
@@ -5560,7 +5916,7 @@
         <p:spPr>
           <a:xfrm>
             <a:off x="457200" y="411480"/>
-            <a:ext cx="2585964" cy="523220"/>
+            <a:ext cx="9990235" cy="523220"/>
           </a:xfrm>
           <a:prstGeom prst="rect">
             <a:avLst/>
@@ -5578,7 +5934,21 @@
                 <a:latin typeface="Montserrat SemiBold" panose="00000700000000000000" pitchFamily="2" charset="0"/>
                 <a:cs typeface="Gotham Pro Medium" panose="02000603030000020004" pitchFamily="50" charset="0"/>
               </a:rPr>
-              <a:t>Заключение</a:t>
+              <a:t>Шаг 2 – Определение</a:t>
+            </a:r>
+            <a:r>
+              <a:rPr lang="en-US" sz="2800" dirty="0" smtClean="0">
+                <a:latin typeface="Montserrat SemiBold" panose="00000700000000000000" pitchFamily="2" charset="0"/>
+                <a:cs typeface="Gotham Pro Medium" panose="02000603030000020004" pitchFamily="50" charset="0"/>
+              </a:rPr>
+              <a:t> </a:t>
+            </a:r>
+            <a:r>
+              <a:rPr lang="ru-RU" sz="2800" dirty="0" smtClean="0">
+                <a:latin typeface="Montserrat SemiBold" panose="00000700000000000000" pitchFamily="2" charset="0"/>
+                <a:cs typeface="Gotham Pro Medium" panose="02000603030000020004" pitchFamily="50" charset="0"/>
+              </a:rPr>
+              <a:t>предварительного диагноза</a:t>
             </a:r>
             <a:endParaRPr lang="ru-RU" sz="2800" dirty="0">
               <a:latin typeface="Montserrat SemiBold" panose="00000700000000000000" pitchFamily="2" charset="0"/>
@@ -5596,7 +5966,7 @@
         <p:spPr>
           <a:xfrm>
             <a:off x="457200" y="1271243"/>
-            <a:ext cx="11265408" cy="3139321"/>
+            <a:ext cx="11265408" cy="3816429"/>
           </a:xfrm>
           <a:prstGeom prst="rect">
             <a:avLst/>
@@ -5614,11 +5984,18 @@
               <a:buChar char="•"/>
             </a:pPr>
             <a:r>
+              <a:rPr lang="en-US" sz="2200" dirty="0" smtClean="0">
+                <a:latin typeface="Gotham Pro" panose="02000503040000020004" pitchFamily="50" charset="0"/>
+                <a:cs typeface="Gotham Pro" panose="02000503040000020004" pitchFamily="50" charset="0"/>
+              </a:rPr>
+              <a:t>ML </a:t>
+            </a:r>
+            <a:r>
               <a:rPr lang="ru-RU" sz="2200" dirty="0" smtClean="0">
                 <a:latin typeface="Gotham Pro" panose="02000503040000020004" pitchFamily="50" charset="0"/>
                 <a:cs typeface="Gotham Pro" panose="02000503040000020004" pitchFamily="50" charset="0"/>
               </a:rPr>
-              <a:t>Разработана языковая модель для определения предварительного диагноза пациента по симптомам на естественном языке</a:t>
+              <a:t>модель предсказывает предварительный диагноз</a:t>
             </a:r>
           </a:p>
           <a:p>
@@ -5637,25 +6014,11 @@
               <a:buChar char="•"/>
             </a:pPr>
             <a:r>
-              <a:rPr lang="ru-RU" sz="2200" dirty="0">
-                <a:latin typeface="Gotham Pro" panose="02000503040000020004" pitchFamily="50" charset="0"/>
-                <a:cs typeface="Gotham Pro" panose="02000503040000020004" pitchFamily="50" charset="0"/>
-              </a:rPr>
-              <a:t>Опубликована альфа версия </a:t>
-            </a:r>
-            <a:r>
-              <a:rPr lang="en-US" sz="2200" dirty="0" smtClean="0">
-                <a:latin typeface="Gotham Pro" panose="02000503040000020004" pitchFamily="50" charset="0"/>
-                <a:cs typeface="Gotham Pro" panose="02000503040000020004" pitchFamily="50" charset="0"/>
-              </a:rPr>
-              <a:t>pip </a:t>
-            </a:r>
-            <a:r>
               <a:rPr lang="ru-RU" sz="2200" dirty="0" smtClean="0">
                 <a:latin typeface="Gotham Pro" panose="02000503040000020004" pitchFamily="50" charset="0"/>
                 <a:cs typeface="Gotham Pro" panose="02000503040000020004" pitchFamily="50" charset="0"/>
               </a:rPr>
-              <a:t>пакета с инструментом</a:t>
+              <a:t>При предсказании диагноза важна интерпретируемость</a:t>
             </a:r>
           </a:p>
           <a:p>
@@ -5664,29 +6027,27 @@
               <a:buChar char="•"/>
             </a:pPr>
             <a:r>
-              <a:rPr lang="en-US" sz="2200" dirty="0" smtClean="0">
-                <a:latin typeface="Gotham Pro" panose="02000503040000020004" pitchFamily="50" charset="0"/>
-                <a:cs typeface="Gotham Pro" panose="02000503040000020004" pitchFamily="50" charset="0"/>
-                <a:hlinkClick r:id="rId3"/>
-              </a:rPr>
-              <a:t>pypi.org/project/</a:t>
-            </a:r>
-            <a:r>
-              <a:rPr lang="en-US" sz="2200" dirty="0" err="1" smtClean="0">
-                <a:latin typeface="Gotham Pro" panose="02000503040000020004" pitchFamily="50" charset="0"/>
-                <a:cs typeface="Gotham Pro" panose="02000503040000020004" pitchFamily="50" charset="0"/>
-                <a:hlinkClick r:id="rId3"/>
-              </a:rPr>
-              <a:t>distool</a:t>
-            </a:r>
-            <a:r>
-              <a:rPr lang="en-US" sz="2200" dirty="0" smtClean="0">
-                <a:latin typeface="Gotham Pro" panose="02000503040000020004" pitchFamily="50" charset="0"/>
-                <a:cs typeface="Gotham Pro" panose="02000503040000020004" pitchFamily="50" charset="0"/>
-                <a:hlinkClick r:id="rId3"/>
-              </a:rPr>
-              <a:t>/</a:t>
-            </a:r>
+              <a:rPr lang="ru-RU" sz="2200" dirty="0" smtClean="0">
+                <a:latin typeface="Gotham Pro" panose="02000503040000020004" pitchFamily="50" charset="0"/>
+                <a:cs typeface="Gotham Pro" panose="02000503040000020004" pitchFamily="50" charset="0"/>
+              </a:rPr>
+              <a:t>Логистическая регрессия</a:t>
+            </a:r>
+          </a:p>
+          <a:p>
+            <a:pPr marL="800100" lvl="1" indent="-342900">
+              <a:buFont typeface="Arial" panose="020B0604020202020204" pitchFamily="34" charset="0"/>
+              <a:buChar char="•"/>
+            </a:pPr>
+            <a:r>
+              <a:rPr lang="ru-RU" sz="2200" dirty="0" smtClean="0">
+                <a:latin typeface="Gotham Pro" panose="02000503040000020004" pitchFamily="50" charset="0"/>
+                <a:cs typeface="Gotham Pro" panose="02000503040000020004" pitchFamily="50" charset="0"/>
+              </a:rPr>
+              <a:t>Что-то более сложное</a:t>
+            </a:r>
+          </a:p>
+          <a:p>
             <a:endParaRPr lang="ru-RU" sz="2200" dirty="0">
               <a:latin typeface="Gotham Pro" panose="02000503040000020004" pitchFamily="50" charset="0"/>
               <a:cs typeface="Gotham Pro" panose="02000503040000020004" pitchFamily="50" charset="0"/>
@@ -5697,6 +6058,15 @@
               <a:buFont typeface="Arial" panose="020B0604020202020204" pitchFamily="34" charset="0"/>
               <a:buChar char="•"/>
             </a:pPr>
+            <a:r>
+              <a:rPr lang="ru-RU" sz="2200" dirty="0" smtClean="0">
+                <a:latin typeface="Gotham Pro" panose="02000503040000020004" pitchFamily="50" charset="0"/>
+                <a:cs typeface="Gotham Pro" panose="02000503040000020004" pitchFamily="50" charset="0"/>
+              </a:rPr>
+              <a:t>Если модель не уверена в предсказании, то агент уточняет наличие необходимых симптомов</a:t>
+            </a:r>
+          </a:p>
+          <a:p>
             <a:endParaRPr lang="ru-RU" sz="2200" dirty="0" smtClean="0">
               <a:latin typeface="Gotham Pro" panose="02000503040000020004" pitchFamily="50" charset="0"/>
               <a:cs typeface="Gotham Pro" panose="02000503040000020004" pitchFamily="50" charset="0"/>
@@ -5712,56 +6082,40 @@
                 <a:latin typeface="Gotham Pro" panose="02000503040000020004" pitchFamily="50" charset="0"/>
                 <a:cs typeface="Gotham Pro" panose="02000503040000020004" pitchFamily="50" charset="0"/>
               </a:rPr>
-              <a:t>Открытый исходный </a:t>
+              <a:t>Первые метрики</a:t>
+            </a:r>
+            <a:r>
+              <a:rPr lang="en-US" sz="2200" dirty="0" smtClean="0">
+                <a:latin typeface="Gotham Pro" panose="02000503040000020004" pitchFamily="50" charset="0"/>
+                <a:cs typeface="Gotham Pro" panose="02000503040000020004" pitchFamily="50" charset="0"/>
+              </a:rPr>
+              <a:t>:</a:t>
+            </a:r>
+          </a:p>
+          <a:p>
+            <a:pPr marL="800100" lvl="1" indent="-342900">
+              <a:buFont typeface="Arial" panose="020B0604020202020204" pitchFamily="34" charset="0"/>
+              <a:buChar char="•"/>
+            </a:pPr>
+            <a:r>
+              <a:rPr lang="en-US" sz="2200" dirty="0" smtClean="0">
+                <a:latin typeface="Gotham Pro" panose="02000503040000020004" pitchFamily="50" charset="0"/>
+                <a:cs typeface="Gotham Pro" panose="02000503040000020004" pitchFamily="50" charset="0"/>
+              </a:rPr>
+              <a:t>Accuracy </a:t>
             </a:r>
             <a:r>
               <a:rPr lang="ru-RU" sz="2200" dirty="0" smtClean="0">
                 <a:latin typeface="Gotham Pro" panose="02000503040000020004" pitchFamily="50" charset="0"/>
                 <a:cs typeface="Gotham Pro" panose="02000503040000020004" pitchFamily="50" charset="0"/>
               </a:rPr>
-              <a:t>код </a:t>
+              <a:t>предсказания болезни без дополнительных запросов - 0,25</a:t>
             </a:r>
             <a:endParaRPr lang="ru-RU" sz="2200" dirty="0">
               <a:latin typeface="Gotham Pro" panose="02000503040000020004" pitchFamily="50" charset="0"/>
               <a:cs typeface="Gotham Pro" panose="02000503040000020004" pitchFamily="50" charset="0"/>
             </a:endParaRPr>
           </a:p>
-          <a:p>
-            <a:pPr marL="800100" lvl="1" indent="-342900">
-              <a:buFont typeface="Arial" panose="020B0604020202020204" pitchFamily="34" charset="0"/>
-              <a:buChar char="•"/>
-            </a:pPr>
-            <a:r>
-              <a:rPr lang="en-US" sz="2200" dirty="0" smtClean="0">
-                <a:latin typeface="Gotham Pro" panose="02000503040000020004" pitchFamily="50" charset="0"/>
-                <a:cs typeface="Gotham Pro" panose="02000503040000020004" pitchFamily="50" charset="0"/>
-                <a:hlinkClick r:id="rId4" action="ppaction://hlinkfile"/>
-              </a:rPr>
-              <a:t>github.com/NIRMA-PATIENT-INTAKE/disease</a:t>
-            </a:r>
-            <a:r>
-              <a:rPr lang="en-US" sz="2200" dirty="0">
-                <a:latin typeface="Gotham Pro" panose="02000503040000020004" pitchFamily="50" charset="0"/>
-                <a:cs typeface="Gotham Pro" panose="02000503040000020004" pitchFamily="50" charset="0"/>
-                <a:hlinkClick r:id="rId4" action="ppaction://hlinkfile"/>
-              </a:rPr>
-              <a:t>/</a:t>
-            </a:r>
-            <a:endParaRPr lang="ru-RU" sz="2200" dirty="0">
-              <a:latin typeface="Gotham Pro" panose="02000503040000020004" pitchFamily="50" charset="0"/>
-              <a:cs typeface="Gotham Pro" panose="02000503040000020004" pitchFamily="50" charset="0"/>
-            </a:endParaRPr>
-          </a:p>
-          <a:p>
-            <a:pPr marL="342900" indent="-342900">
-              <a:buFont typeface="Arial" panose="020B0604020202020204" pitchFamily="34" charset="0"/>
-              <a:buChar char="•"/>
-            </a:pPr>
-            <a:endParaRPr lang="ru-RU" sz="2200" dirty="0" smtClean="0">
-              <a:latin typeface="Gotham Pro" panose="02000503040000020004" pitchFamily="50" charset="0"/>
-              <a:cs typeface="Gotham Pro" panose="02000503040000020004" pitchFamily="50" charset="0"/>
-            </a:endParaRPr>
-          </a:p>
         </p:txBody>
       </p:sp>
       <p:sp>
@@ -5773,7 +6127,7 @@
         <p:spPr>
           <a:xfrm>
             <a:off x="11311128" y="5477256"/>
-            <a:ext cx="592022" cy="369332"/>
+            <a:ext cx="616579" cy="369332"/>
           </a:xfrm>
           <a:prstGeom prst="rect">
             <a:avLst/>
@@ -5798,7 +6152,7 @@
                 <a:latin typeface="Gotham Pro" panose="02000503040000020004" pitchFamily="50" charset="0"/>
                 <a:cs typeface="Gotham Pro" panose="02000503040000020004" pitchFamily="50" charset="0"/>
               </a:rPr>
-              <a:t>/9</a:t>
+              <a:t>/11</a:t>
             </a:r>
             <a:endParaRPr lang="ru-RU" dirty="0">
               <a:latin typeface="Gotham Pro" panose="02000503040000020004" pitchFamily="50" charset="0"/>
@@ -5810,7 +6164,7 @@
     </p:spTree>
     <p:extLst>
       <p:ext uri="{BB962C8B-B14F-4D97-AF65-F5344CB8AC3E}">
-        <p14:creationId xmlns:p14="http://schemas.microsoft.com/office/powerpoint/2010/main" val="1626224041"/>
+        <p14:creationId xmlns:p14="http://schemas.microsoft.com/office/powerpoint/2010/main" val="2779089913"/>
       </p:ext>
     </p:extLst>
   </p:cSld>
@@ -5849,7 +6203,7 @@
           <p:cNvPr id="3" name="Рисунок 2">
             <a:extLst>
               <a:ext uri="{FF2B5EF4-FFF2-40B4-BE49-F238E27FC236}">
-                <a16:creationId xmlns:a16="http://schemas.microsoft.com/office/drawing/2014/main" id="{652C3130-651D-43CB-85BA-61D12C420DAE}"/>
+                <a16:creationId xmlns:a16="http://schemas.microsoft.com/office/drawing/2014/main" id="{A8692761-F9A2-4120-B903-D14C9B7F3ABC}"/>
               </a:ext>
             </a:extLst>
           </p:cNvPr>
@@ -5880,10 +6234,266 @@
           </a:prstGeom>
         </p:spPr>
       </p:pic>
+      <p:sp>
+        <p:nvSpPr>
+          <p:cNvPr id="2" name="TextBox 1"/>
+          <p:cNvSpPr txBox="1"/>
+          <p:nvPr/>
+        </p:nvSpPr>
+        <p:spPr>
+          <a:xfrm>
+            <a:off x="457200" y="411480"/>
+            <a:ext cx="2585964" cy="523220"/>
+          </a:xfrm>
+          <a:prstGeom prst="rect">
+            <a:avLst/>
+          </a:prstGeom>
+          <a:noFill/>
+        </p:spPr>
+        <p:txBody>
+          <a:bodyPr wrap="none" rtlCol="0">
+            <a:spAutoFit/>
+          </a:bodyPr>
+          <a:lstStyle/>
+          <a:p>
+            <a:r>
+              <a:rPr lang="ru-RU" sz="2800" dirty="0" smtClean="0">
+                <a:latin typeface="Montserrat SemiBold" panose="00000700000000000000" pitchFamily="2" charset="0"/>
+                <a:cs typeface="Gotham Pro Medium" panose="02000603030000020004" pitchFamily="50" charset="0"/>
+              </a:rPr>
+              <a:t>Заключение</a:t>
+            </a:r>
+            <a:endParaRPr lang="ru-RU" sz="2800" dirty="0">
+              <a:latin typeface="Montserrat SemiBold" panose="00000700000000000000" pitchFamily="2" charset="0"/>
+              <a:cs typeface="Gotham Pro Medium" panose="02000603030000020004" pitchFamily="50" charset="0"/>
+            </a:endParaRPr>
+          </a:p>
+        </p:txBody>
+      </p:sp>
+      <p:sp>
+        <p:nvSpPr>
+          <p:cNvPr id="6" name="TextBox 5"/>
+          <p:cNvSpPr txBox="1"/>
+          <p:nvPr/>
+        </p:nvSpPr>
+        <p:spPr>
+          <a:xfrm>
+            <a:off x="457200" y="1271243"/>
+            <a:ext cx="11265408" cy="3477875"/>
+          </a:xfrm>
+          <a:prstGeom prst="rect">
+            <a:avLst/>
+          </a:prstGeom>
+          <a:noFill/>
+        </p:spPr>
+        <p:txBody>
+          <a:bodyPr wrap="square" rtlCol="0">
+            <a:spAutoFit/>
+          </a:bodyPr>
+          <a:lstStyle/>
+          <a:p>
+            <a:pPr marL="342900" indent="-342900">
+              <a:buFont typeface="Arial" panose="020B0604020202020204" pitchFamily="34" charset="0"/>
+              <a:buChar char="•"/>
+            </a:pPr>
+            <a:r>
+              <a:rPr lang="ru-RU" sz="2200" dirty="0" smtClean="0">
+                <a:latin typeface="Gotham Pro" panose="02000503040000020004" pitchFamily="50" charset="0"/>
+                <a:cs typeface="Gotham Pro" panose="02000503040000020004" pitchFamily="50" charset="0"/>
+              </a:rPr>
+              <a:t>Разработан прототип языковой модели </a:t>
+            </a:r>
+            <a:r>
+              <a:rPr lang="ru-RU" sz="2200" dirty="0" smtClean="0">
+                <a:latin typeface="Gotham Pro" panose="02000503040000020004" pitchFamily="50" charset="0"/>
+                <a:cs typeface="Gotham Pro" panose="02000503040000020004" pitchFamily="50" charset="0"/>
+              </a:rPr>
+              <a:t>для определения предварительного диагноза пациента по симптомам на естественном языке</a:t>
+            </a:r>
+          </a:p>
+          <a:p>
+            <a:pPr marL="342900" indent="-342900">
+              <a:buFont typeface="Arial" panose="020B0604020202020204" pitchFamily="34" charset="0"/>
+              <a:buChar char="•"/>
+            </a:pPr>
+            <a:endParaRPr lang="ru-RU" sz="2200" dirty="0">
+              <a:latin typeface="Gotham Pro" panose="02000503040000020004" pitchFamily="50" charset="0"/>
+              <a:cs typeface="Gotham Pro" panose="02000503040000020004" pitchFamily="50" charset="0"/>
+            </a:endParaRPr>
+          </a:p>
+          <a:p>
+            <a:pPr marL="342900" indent="-342900">
+              <a:buFont typeface="Arial" panose="020B0604020202020204" pitchFamily="34" charset="0"/>
+              <a:buChar char="•"/>
+            </a:pPr>
+            <a:r>
+              <a:rPr lang="ru-RU" sz="2200" dirty="0">
+                <a:latin typeface="Gotham Pro" panose="02000503040000020004" pitchFamily="50" charset="0"/>
+                <a:cs typeface="Gotham Pro" panose="02000503040000020004" pitchFamily="50" charset="0"/>
+              </a:rPr>
+              <a:t>Опубликована альфа версия </a:t>
+            </a:r>
+            <a:r>
+              <a:rPr lang="en-US" sz="2200" dirty="0" smtClean="0">
+                <a:latin typeface="Gotham Pro" panose="02000503040000020004" pitchFamily="50" charset="0"/>
+                <a:cs typeface="Gotham Pro" panose="02000503040000020004" pitchFamily="50" charset="0"/>
+              </a:rPr>
+              <a:t>pip </a:t>
+            </a:r>
+            <a:r>
+              <a:rPr lang="ru-RU" sz="2200" dirty="0" smtClean="0">
+                <a:latin typeface="Gotham Pro" panose="02000503040000020004" pitchFamily="50" charset="0"/>
+                <a:cs typeface="Gotham Pro" panose="02000503040000020004" pitchFamily="50" charset="0"/>
+              </a:rPr>
+              <a:t>пакета с инструментом</a:t>
+            </a:r>
+          </a:p>
+          <a:p>
+            <a:pPr marL="800100" lvl="1" indent="-342900">
+              <a:buFont typeface="Arial" panose="020B0604020202020204" pitchFamily="34" charset="0"/>
+              <a:buChar char="•"/>
+            </a:pPr>
+            <a:r>
+              <a:rPr lang="en-US" sz="2200" dirty="0" smtClean="0">
+                <a:latin typeface="Gotham Pro" panose="02000503040000020004" pitchFamily="50" charset="0"/>
+                <a:cs typeface="Gotham Pro" panose="02000503040000020004" pitchFamily="50" charset="0"/>
+                <a:hlinkClick r:id="rId3"/>
+              </a:rPr>
+              <a:t>pypi.org/project/</a:t>
+            </a:r>
+            <a:r>
+              <a:rPr lang="en-US" sz="2200" dirty="0" err="1" smtClean="0">
+                <a:latin typeface="Gotham Pro" panose="02000503040000020004" pitchFamily="50" charset="0"/>
+                <a:cs typeface="Gotham Pro" panose="02000503040000020004" pitchFamily="50" charset="0"/>
+                <a:hlinkClick r:id="rId3"/>
+              </a:rPr>
+              <a:t>distool</a:t>
+            </a:r>
+            <a:r>
+              <a:rPr lang="en-US" sz="2200" dirty="0" smtClean="0">
+                <a:latin typeface="Gotham Pro" panose="02000503040000020004" pitchFamily="50" charset="0"/>
+                <a:cs typeface="Gotham Pro" panose="02000503040000020004" pitchFamily="50" charset="0"/>
+                <a:hlinkClick r:id="rId3"/>
+              </a:rPr>
+              <a:t>/</a:t>
+            </a:r>
+            <a:endParaRPr lang="ru-RU" sz="2200" dirty="0">
+              <a:latin typeface="Gotham Pro" panose="02000503040000020004" pitchFamily="50" charset="0"/>
+              <a:cs typeface="Gotham Pro" panose="02000503040000020004" pitchFamily="50" charset="0"/>
+            </a:endParaRPr>
+          </a:p>
+          <a:p>
+            <a:pPr marL="342900" indent="-342900">
+              <a:buFont typeface="Arial" panose="020B0604020202020204" pitchFamily="34" charset="0"/>
+              <a:buChar char="•"/>
+            </a:pPr>
+            <a:endParaRPr lang="ru-RU" sz="2200" dirty="0" smtClean="0">
+              <a:latin typeface="Gotham Pro" panose="02000503040000020004" pitchFamily="50" charset="0"/>
+              <a:cs typeface="Gotham Pro" panose="02000503040000020004" pitchFamily="50" charset="0"/>
+            </a:endParaRPr>
+          </a:p>
+          <a:p>
+            <a:pPr marL="342900" indent="-342900">
+              <a:buFont typeface="Arial" panose="020B0604020202020204" pitchFamily="34" charset="0"/>
+              <a:buChar char="•"/>
+            </a:pPr>
+            <a:r>
+              <a:rPr lang="ru-RU" sz="2200" dirty="0" smtClean="0">
+                <a:latin typeface="Gotham Pro" panose="02000503040000020004" pitchFamily="50" charset="0"/>
+                <a:cs typeface="Gotham Pro" panose="02000503040000020004" pitchFamily="50" charset="0"/>
+              </a:rPr>
+              <a:t>Открытый исходный код </a:t>
+            </a:r>
+            <a:endParaRPr lang="ru-RU" sz="2200" dirty="0">
+              <a:latin typeface="Gotham Pro" panose="02000503040000020004" pitchFamily="50" charset="0"/>
+              <a:cs typeface="Gotham Pro" panose="02000503040000020004" pitchFamily="50" charset="0"/>
+            </a:endParaRPr>
+          </a:p>
+          <a:p>
+            <a:pPr marL="800100" lvl="1" indent="-342900">
+              <a:buFont typeface="Arial" panose="020B0604020202020204" pitchFamily="34" charset="0"/>
+              <a:buChar char="•"/>
+            </a:pPr>
+            <a:r>
+              <a:rPr lang="en-US" sz="2200" dirty="0" smtClean="0">
+                <a:latin typeface="Gotham Pro" panose="02000503040000020004" pitchFamily="50" charset="0"/>
+                <a:cs typeface="Gotham Pro" panose="02000503040000020004" pitchFamily="50" charset="0"/>
+                <a:hlinkClick r:id="rId4" action="ppaction://hlinkfile"/>
+              </a:rPr>
+              <a:t>github.com/NIRMA-PATIENT-INTAKE/disease</a:t>
+            </a:r>
+            <a:r>
+              <a:rPr lang="en-US" sz="2200" dirty="0">
+                <a:latin typeface="Gotham Pro" panose="02000503040000020004" pitchFamily="50" charset="0"/>
+                <a:cs typeface="Gotham Pro" panose="02000503040000020004" pitchFamily="50" charset="0"/>
+                <a:hlinkClick r:id="rId4" action="ppaction://hlinkfile"/>
+              </a:rPr>
+              <a:t>/</a:t>
+            </a:r>
+            <a:endParaRPr lang="ru-RU" sz="2200" dirty="0">
+              <a:latin typeface="Gotham Pro" panose="02000503040000020004" pitchFamily="50" charset="0"/>
+              <a:cs typeface="Gotham Pro" panose="02000503040000020004" pitchFamily="50" charset="0"/>
+            </a:endParaRPr>
+          </a:p>
+          <a:p>
+            <a:pPr marL="342900" indent="-342900">
+              <a:buFont typeface="Arial" panose="020B0604020202020204" pitchFamily="34" charset="0"/>
+              <a:buChar char="•"/>
+            </a:pPr>
+            <a:endParaRPr lang="ru-RU" sz="2200" dirty="0" smtClean="0">
+              <a:latin typeface="Gotham Pro" panose="02000503040000020004" pitchFamily="50" charset="0"/>
+              <a:cs typeface="Gotham Pro" panose="02000503040000020004" pitchFamily="50" charset="0"/>
+            </a:endParaRPr>
+          </a:p>
+        </p:txBody>
+      </p:sp>
+      <p:sp>
+        <p:nvSpPr>
+          <p:cNvPr id="5" name="TextBox 4"/>
+          <p:cNvSpPr txBox="1"/>
+          <p:nvPr/>
+        </p:nvSpPr>
+        <p:spPr>
+          <a:xfrm>
+            <a:off x="11311128" y="5477256"/>
+            <a:ext cx="614014" cy="369332"/>
+          </a:xfrm>
+          <a:prstGeom prst="rect">
+            <a:avLst/>
+          </a:prstGeom>
+          <a:noFill/>
+        </p:spPr>
+        <p:txBody>
+          <a:bodyPr wrap="none" rtlCol="0">
+            <a:spAutoFit/>
+          </a:bodyPr>
+          <a:lstStyle/>
+          <a:p>
+            <a:r>
+              <a:rPr lang="ru-RU" dirty="0" smtClean="0">
+                <a:latin typeface="Gotham Pro" panose="02000503040000020004" pitchFamily="50" charset="0"/>
+                <a:cs typeface="Gotham Pro" panose="02000503040000020004" pitchFamily="50" charset="0"/>
+              </a:rPr>
+              <a:t>9</a:t>
+            </a:r>
+            <a:r>
+              <a:rPr lang="ru-RU" dirty="0" smtClean="0">
+                <a:latin typeface="Gotham Pro" panose="02000503040000020004" pitchFamily="50" charset="0"/>
+                <a:cs typeface="Gotham Pro" panose="02000503040000020004" pitchFamily="50" charset="0"/>
+              </a:rPr>
+              <a:t>/11</a:t>
+            </a:r>
+            <a:endParaRPr lang="ru-RU" dirty="0">
+              <a:latin typeface="Gotham Pro" panose="02000503040000020004" pitchFamily="50" charset="0"/>
+              <a:cs typeface="Gotham Pro" panose="02000503040000020004" pitchFamily="50" charset="0"/>
+            </a:endParaRPr>
+          </a:p>
+        </p:txBody>
+      </p:sp>
     </p:spTree>
     <p:extLst>
       <p:ext uri="{BB962C8B-B14F-4D97-AF65-F5344CB8AC3E}">
-        <p14:creationId xmlns:p14="http://schemas.microsoft.com/office/powerpoint/2010/main" val="2007705612"/>
+        <p14:creationId xmlns:p14="http://schemas.microsoft.com/office/powerpoint/2010/main" val="1626224041"/>
       </p:ext>
     </p:extLst>
   </p:cSld>

</xml_diff>